<commit_message>
Duncan Demo1 presentation contribution
</commit_message>
<xml_diff>
--- a/demo1presentation/Smart NFC Card Application.pptx
+++ b/demo1presentation/Smart NFC Card Application.pptx
@@ -5,7 +5,18 @@
     <p:sldMasterId id="2147483660" r:id="rId1"/>
   </p:sldMasterIdLst>
   <p:sldIdLst>
-    <p:sldId id="265" r:id="rId2"/>
+    <p:sldId id="256" r:id="rId2"/>
+    <p:sldId id="257" r:id="rId3"/>
+    <p:sldId id="258" r:id="rId4"/>
+    <p:sldId id="265" r:id="rId5"/>
+    <p:sldId id="259" r:id="rId6"/>
+    <p:sldId id="262" r:id="rId7"/>
+    <p:sldId id="263" r:id="rId8"/>
+    <p:sldId id="264" r:id="rId9"/>
+    <p:sldId id="260" r:id="rId10"/>
+    <p:sldId id="266" r:id="rId11"/>
+    <p:sldId id="267" r:id="rId12"/>
+    <p:sldId id="261" r:id="rId13"/>
   </p:sldIdLst>
   <p:sldSz cx="12192000" cy="6858000"/>
   <p:notesSz cx="6858000" cy="9144000"/>
@@ -614,7 +625,7 @@
           <a:p>
             <a:fld id="{534AF478-E474-4BE4-BC14-219371A51076}" type="datetimeFigureOut">
               <a:rPr lang="en-ZA" smtClean="0"/>
-              <a:t>2019/05/03</a:t>
+              <a:t>2019/05/02</a:t>
             </a:fld>
             <a:endParaRPr lang="en-ZA"/>
           </a:p>
@@ -910,7 +921,7 @@
           <a:p>
             <a:fld id="{534AF478-E474-4BE4-BC14-219371A51076}" type="datetimeFigureOut">
               <a:rPr lang="en-ZA" smtClean="0"/>
-              <a:t>2019/05/03</a:t>
+              <a:t>2019/05/02</a:t>
             </a:fld>
             <a:endParaRPr lang="en-ZA"/>
           </a:p>
@@ -1158,7 +1169,7 @@
           <a:p>
             <a:fld id="{534AF478-E474-4BE4-BC14-219371A51076}" type="datetimeFigureOut">
               <a:rPr lang="en-ZA" smtClean="0"/>
-              <a:t>2019/05/03</a:t>
+              <a:t>2019/05/02</a:t>
             </a:fld>
             <a:endParaRPr lang="en-ZA"/>
           </a:p>
@@ -1698,7 +1709,7 @@
           <a:p>
             <a:fld id="{534AF478-E474-4BE4-BC14-219371A51076}" type="datetimeFigureOut">
               <a:rPr lang="en-ZA" smtClean="0"/>
-              <a:t>2019/05/03</a:t>
+              <a:t>2019/05/02</a:t>
             </a:fld>
             <a:endParaRPr lang="en-ZA"/>
           </a:p>
@@ -1946,7 +1957,7 @@
           <a:p>
             <a:fld id="{534AF478-E474-4BE4-BC14-219371A51076}" type="datetimeFigureOut">
               <a:rPr lang="en-ZA" smtClean="0"/>
-              <a:t>2019/05/03</a:t>
+              <a:t>2019/05/02</a:t>
             </a:fld>
             <a:endParaRPr lang="en-ZA"/>
           </a:p>
@@ -2478,7 +2489,7 @@
           <a:p>
             <a:fld id="{534AF478-E474-4BE4-BC14-219371A51076}" type="datetimeFigureOut">
               <a:rPr lang="en-ZA" smtClean="0"/>
-              <a:t>2019/05/03</a:t>
+              <a:t>2019/05/02</a:t>
             </a:fld>
             <a:endParaRPr lang="en-ZA"/>
           </a:p>
@@ -2775,7 +2786,7 @@
           <a:p>
             <a:fld id="{534AF478-E474-4BE4-BC14-219371A51076}" type="datetimeFigureOut">
               <a:rPr lang="en-ZA" smtClean="0"/>
-              <a:t>2019/05/03</a:t>
+              <a:t>2019/05/02</a:t>
             </a:fld>
             <a:endParaRPr lang="en-ZA"/>
           </a:p>
@@ -2949,7 +2960,7 @@
           <a:p>
             <a:fld id="{534AF478-E474-4BE4-BC14-219371A51076}" type="datetimeFigureOut">
               <a:rPr lang="en-ZA" smtClean="0"/>
-              <a:t>2019/05/03</a:t>
+              <a:t>2019/05/02</a:t>
             </a:fld>
             <a:endParaRPr lang="en-ZA"/>
           </a:p>
@@ -3129,7 +3140,7 @@
           <a:p>
             <a:fld id="{534AF478-E474-4BE4-BC14-219371A51076}" type="datetimeFigureOut">
               <a:rPr lang="en-ZA" smtClean="0"/>
-              <a:t>2019/05/03</a:t>
+              <a:t>2019/05/02</a:t>
             </a:fld>
             <a:endParaRPr lang="en-ZA"/>
           </a:p>
@@ -3299,7 +3310,7 @@
           <a:p>
             <a:fld id="{534AF478-E474-4BE4-BC14-219371A51076}" type="datetimeFigureOut">
               <a:rPr lang="en-ZA" smtClean="0"/>
-              <a:t>2019/05/03</a:t>
+              <a:t>2019/05/02</a:t>
             </a:fld>
             <a:endParaRPr lang="en-ZA"/>
           </a:p>
@@ -3550,7 +3561,7 @@
           <a:p>
             <a:fld id="{534AF478-E474-4BE4-BC14-219371A51076}" type="datetimeFigureOut">
               <a:rPr lang="en-ZA" smtClean="0"/>
-              <a:t>2019/05/03</a:t>
+              <a:t>2019/05/02</a:t>
             </a:fld>
             <a:endParaRPr lang="en-ZA"/>
           </a:p>
@@ -3847,7 +3858,7 @@
           <a:p>
             <a:fld id="{534AF478-E474-4BE4-BC14-219371A51076}" type="datetimeFigureOut">
               <a:rPr lang="en-ZA" smtClean="0"/>
-              <a:t>2019/05/03</a:t>
+              <a:t>2019/05/02</a:t>
             </a:fld>
             <a:endParaRPr lang="en-ZA"/>
           </a:p>
@@ -4289,7 +4300,7 @@
           <a:p>
             <a:fld id="{534AF478-E474-4BE4-BC14-219371A51076}" type="datetimeFigureOut">
               <a:rPr lang="en-ZA" smtClean="0"/>
-              <a:t>2019/05/03</a:t>
+              <a:t>2019/05/02</a:t>
             </a:fld>
             <a:endParaRPr lang="en-ZA"/>
           </a:p>
@@ -4407,7 +4418,7 @@
           <a:p>
             <a:fld id="{534AF478-E474-4BE4-BC14-219371A51076}" type="datetimeFigureOut">
               <a:rPr lang="en-ZA" smtClean="0"/>
-              <a:t>2019/05/03</a:t>
+              <a:t>2019/05/02</a:t>
             </a:fld>
             <a:endParaRPr lang="en-ZA"/>
           </a:p>
@@ -4502,7 +4513,7 @@
           <a:p>
             <a:fld id="{534AF478-E474-4BE4-BC14-219371A51076}" type="datetimeFigureOut">
               <a:rPr lang="en-ZA" smtClean="0"/>
-              <a:t>2019/05/03</a:t>
+              <a:t>2019/05/02</a:t>
             </a:fld>
             <a:endParaRPr lang="en-ZA"/>
           </a:p>
@@ -4785,7 +4796,7 @@
           <a:p>
             <a:fld id="{534AF478-E474-4BE4-BC14-219371A51076}" type="datetimeFigureOut">
               <a:rPr lang="en-ZA" smtClean="0"/>
-              <a:t>2019/05/03</a:t>
+              <a:t>2019/05/02</a:t>
             </a:fld>
             <a:endParaRPr lang="en-ZA"/>
           </a:p>
@@ -5076,7 +5087,7 @@
           <a:p>
             <a:fld id="{534AF478-E474-4BE4-BC14-219371A51076}" type="datetimeFigureOut">
               <a:rPr lang="en-ZA" smtClean="0"/>
-              <a:t>2019/05/03</a:t>
+              <a:t>2019/05/02</a:t>
             </a:fld>
             <a:endParaRPr lang="en-ZA"/>
           </a:p>
@@ -5606,7 +5617,7 @@
           <a:p>
             <a:fld id="{534AF478-E474-4BE4-BC14-219371A51076}" type="datetimeFigureOut">
               <a:rPr lang="en-ZA" smtClean="0"/>
-              <a:t>2019/05/03</a:t>
+              <a:t>2019/05/02</a:t>
             </a:fld>
             <a:endParaRPr lang="en-ZA"/>
           </a:p>
@@ -6142,6 +6153,873 @@
           <p:cNvPr id="2" name="Title 1">
             <a:extLst>
               <a:ext uri="{FF2B5EF4-FFF2-40B4-BE49-F238E27FC236}">
+                <a16:creationId xmlns:a16="http://schemas.microsoft.com/office/drawing/2014/main" id="{55CD55BE-1011-421F-8692-3EA4C9A71109}"/>
+              </a:ext>
+            </a:extLst>
+          </p:cNvPr>
+          <p:cNvSpPr>
+            <a:spLocks noGrp="1"/>
+          </p:cNvSpPr>
+          <p:nvPr>
+            <p:ph type="ctrTitle"/>
+          </p:nvPr>
+        </p:nvSpPr>
+        <p:spPr>
+          <a:xfrm>
+            <a:off x="2237174" y="905932"/>
+            <a:ext cx="9159318" cy="1134534"/>
+          </a:xfrm>
+        </p:spPr>
+        <p:txBody>
+          <a:bodyPr/>
+          <a:lstStyle/>
+          <a:p>
+            <a:pPr algn="ctr"/>
+            <a:r>
+              <a:rPr lang="en-ZA" dirty="0"/>
+              <a:t>Smart NFC Card Application </a:t>
+            </a:r>
+          </a:p>
+        </p:txBody>
+      </p:sp>
+      <p:sp>
+        <p:nvSpPr>
+          <p:cNvPr id="3" name="Subtitle 2">
+            <a:extLst>
+              <a:ext uri="{FF2B5EF4-FFF2-40B4-BE49-F238E27FC236}">
+                <a16:creationId xmlns:a16="http://schemas.microsoft.com/office/drawing/2014/main" id="{48BB1E0B-E9CC-4FC9-909B-833406A00C67}"/>
+              </a:ext>
+            </a:extLst>
+          </p:cNvPr>
+          <p:cNvSpPr>
+            <a:spLocks noGrp="1"/>
+          </p:cNvSpPr>
+          <p:nvPr>
+            <p:ph type="subTitle" idx="1"/>
+          </p:nvPr>
+        </p:nvSpPr>
+        <p:spPr>
+          <a:xfrm>
+            <a:off x="4039341" y="2040466"/>
+            <a:ext cx="7188474" cy="861134"/>
+          </a:xfrm>
+        </p:spPr>
+        <p:txBody>
+          <a:bodyPr>
+            <a:normAutofit/>
+          </a:bodyPr>
+          <a:lstStyle/>
+          <a:p>
+            <a:r>
+              <a:rPr lang="en-ZA" sz="3200" dirty="0"/>
+              <a:t>Vast Expanse (Team 7)</a:t>
+            </a:r>
+          </a:p>
+        </p:txBody>
+      </p:sp>
+      <p:pic>
+        <p:nvPicPr>
+          <p:cNvPr id="5" name="Picture 4">
+            <a:extLst>
+              <a:ext uri="{FF2B5EF4-FFF2-40B4-BE49-F238E27FC236}">
+                <a16:creationId xmlns:a16="http://schemas.microsoft.com/office/drawing/2014/main" id="{6836BD1E-7249-414B-89A8-62A420C89FB6}"/>
+              </a:ext>
+            </a:extLst>
+          </p:cNvPr>
+          <p:cNvPicPr>
+            <a:picLocks noChangeAspect="1"/>
+          </p:cNvPicPr>
+          <p:nvPr/>
+        </p:nvPicPr>
+        <p:blipFill>
+          <a:blip r:embed="rId2">
+            <a:extLst>
+              <a:ext uri="{28A0092B-C50C-407E-A947-70E740481C1C}">
+                <a14:useLocalDpi xmlns:a14="http://schemas.microsoft.com/office/drawing/2010/main" val="0"/>
+              </a:ext>
+            </a:extLst>
+          </a:blip>
+          <a:stretch>
+            <a:fillRect/>
+          </a:stretch>
+        </p:blipFill>
+        <p:spPr>
+          <a:xfrm>
+            <a:off x="3762858" y="3525839"/>
+            <a:ext cx="3218212" cy="1020590"/>
+          </a:xfrm>
+          <a:prstGeom prst="rect">
+            <a:avLst/>
+          </a:prstGeom>
+        </p:spPr>
+      </p:pic>
+      <p:pic>
+        <p:nvPicPr>
+          <p:cNvPr id="10" name="Picture 9" descr="A picture containing object&#10;&#10;Description automatically generated">
+            <a:extLst>
+              <a:ext uri="{FF2B5EF4-FFF2-40B4-BE49-F238E27FC236}">
+                <a16:creationId xmlns:a16="http://schemas.microsoft.com/office/drawing/2014/main" id="{C00E0539-1AE6-4D92-B057-FDE521654803}"/>
+              </a:ext>
+            </a:extLst>
+          </p:cNvPr>
+          <p:cNvPicPr>
+            <a:picLocks noChangeAspect="1"/>
+          </p:cNvPicPr>
+          <p:nvPr/>
+        </p:nvPicPr>
+        <p:blipFill>
+          <a:blip r:embed="rId3">
+            <a:extLst>
+              <a:ext uri="{28A0092B-C50C-407E-A947-70E740481C1C}">
+                <a14:useLocalDpi xmlns:a14="http://schemas.microsoft.com/office/drawing/2010/main" val="0"/>
+              </a:ext>
+            </a:extLst>
+          </a:blip>
+          <a:stretch>
+            <a:fillRect/>
+          </a:stretch>
+        </p:blipFill>
+        <p:spPr>
+          <a:xfrm>
+            <a:off x="7496175" y="3429000"/>
+            <a:ext cx="3831109" cy="1108430"/>
+          </a:xfrm>
+          <a:prstGeom prst="rect">
+            <a:avLst/>
+          </a:prstGeom>
+        </p:spPr>
+      </p:pic>
+    </p:spTree>
+    <p:extLst>
+      <p:ext uri="{BB962C8B-B14F-4D97-AF65-F5344CB8AC3E}">
+        <p14:creationId xmlns:p14="http://schemas.microsoft.com/office/powerpoint/2010/main" val="831551234"/>
+      </p:ext>
+    </p:extLst>
+  </p:cSld>
+  <p:clrMapOvr>
+    <a:masterClrMapping/>
+  </p:clrMapOvr>
+</p:sld>
+</file>
+
+<file path=ppt/slides/slide10.xml><?xml version="1.0" encoding="utf-8"?>
+<p:sld xmlns:a="http://schemas.openxmlformats.org/drawingml/2006/main" xmlns:r="http://schemas.openxmlformats.org/officeDocument/2006/relationships" xmlns:p="http://schemas.openxmlformats.org/presentationml/2006/main">
+  <p:cSld>
+    <p:spTree>
+      <p:nvGrpSpPr>
+        <p:cNvPr id="1" name=""/>
+        <p:cNvGrpSpPr/>
+        <p:nvPr/>
+      </p:nvGrpSpPr>
+      <p:grpSpPr>
+        <a:xfrm>
+          <a:off x="0" y="0"/>
+          <a:ext cx="0" cy="0"/>
+          <a:chOff x="0" y="0"/>
+          <a:chExt cx="0" cy="0"/>
+        </a:xfrm>
+      </p:grpSpPr>
+      <p:pic>
+        <p:nvPicPr>
+          <p:cNvPr id="6" name="Content Placeholder 5" descr="A screenshot of a computer&#10;&#10;Description automatically generated">
+            <a:extLst>
+              <a:ext uri="{FF2B5EF4-FFF2-40B4-BE49-F238E27FC236}">
+                <a16:creationId xmlns:a16="http://schemas.microsoft.com/office/drawing/2014/main" id="{D4BE0B96-8B00-4644-8029-CBFABA044793}"/>
+              </a:ext>
+            </a:extLst>
+          </p:cNvPr>
+          <p:cNvPicPr>
+            <a:picLocks noGrp="1" noChangeAspect="1"/>
+          </p:cNvPicPr>
+          <p:nvPr>
+            <p:ph sz="half" idx="1"/>
+          </p:nvPr>
+        </p:nvPicPr>
+        <p:blipFill>
+          <a:blip r:embed="rId2">
+            <a:extLst>
+              <a:ext uri="{28A0092B-C50C-407E-A947-70E740481C1C}">
+                <a14:useLocalDpi xmlns:a14="http://schemas.microsoft.com/office/drawing/2010/main" val="0"/>
+              </a:ext>
+            </a:extLst>
+          </a:blip>
+          <a:stretch>
+            <a:fillRect/>
+          </a:stretch>
+        </p:blipFill>
+        <p:spPr>
+          <a:xfrm>
+            <a:off x="1461252" y="666257"/>
+            <a:ext cx="9269496" cy="5525486"/>
+          </a:xfrm>
+        </p:spPr>
+      </p:pic>
+    </p:spTree>
+    <p:extLst>
+      <p:ext uri="{BB962C8B-B14F-4D97-AF65-F5344CB8AC3E}">
+        <p14:creationId xmlns:p14="http://schemas.microsoft.com/office/powerpoint/2010/main" val="3951181089"/>
+      </p:ext>
+    </p:extLst>
+  </p:cSld>
+  <p:clrMapOvr>
+    <a:masterClrMapping/>
+  </p:clrMapOvr>
+</p:sld>
+</file>
+
+<file path=ppt/slides/slide11.xml><?xml version="1.0" encoding="utf-8"?>
+<p:sld xmlns:a="http://schemas.openxmlformats.org/drawingml/2006/main" xmlns:r="http://schemas.openxmlformats.org/officeDocument/2006/relationships" xmlns:p="http://schemas.openxmlformats.org/presentationml/2006/main">
+  <p:cSld>
+    <p:spTree>
+      <p:nvGrpSpPr>
+        <p:cNvPr id="1" name=""/>
+        <p:cNvGrpSpPr/>
+        <p:nvPr/>
+      </p:nvGrpSpPr>
+      <p:grpSpPr>
+        <a:xfrm>
+          <a:off x="0" y="0"/>
+          <a:ext cx="0" cy="0"/>
+          <a:chOff x="0" y="0"/>
+          <a:chExt cx="0" cy="0"/>
+        </a:xfrm>
+      </p:grpSpPr>
+      <p:pic>
+        <p:nvPicPr>
+          <p:cNvPr id="6" name="Content Placeholder 5" descr="A screenshot of a social media post&#10;&#10;Description automatically generated">
+            <a:extLst>
+              <a:ext uri="{FF2B5EF4-FFF2-40B4-BE49-F238E27FC236}">
+                <a16:creationId xmlns:a16="http://schemas.microsoft.com/office/drawing/2014/main" id="{289E9F2C-2FAA-4D5D-8EEA-CA5156272E80}"/>
+              </a:ext>
+            </a:extLst>
+          </p:cNvPr>
+          <p:cNvPicPr>
+            <a:picLocks noGrp="1" noChangeAspect="1"/>
+          </p:cNvPicPr>
+          <p:nvPr>
+            <p:ph sz="half" idx="1"/>
+          </p:nvPr>
+        </p:nvPicPr>
+        <p:blipFill>
+          <a:blip r:embed="rId2">
+            <a:extLst>
+              <a:ext uri="{28A0092B-C50C-407E-A947-70E740481C1C}">
+                <a14:useLocalDpi xmlns:a14="http://schemas.microsoft.com/office/drawing/2010/main" val="0"/>
+              </a:ext>
+            </a:extLst>
+          </a:blip>
+          <a:stretch>
+            <a:fillRect/>
+          </a:stretch>
+        </p:blipFill>
+        <p:spPr>
+          <a:xfrm>
+            <a:off x="1183782" y="2768367"/>
+            <a:ext cx="9824436" cy="2056991"/>
+          </a:xfrm>
+        </p:spPr>
+      </p:pic>
+    </p:spTree>
+    <p:extLst>
+      <p:ext uri="{BB962C8B-B14F-4D97-AF65-F5344CB8AC3E}">
+        <p14:creationId xmlns:p14="http://schemas.microsoft.com/office/powerpoint/2010/main" val="1070509498"/>
+      </p:ext>
+    </p:extLst>
+  </p:cSld>
+  <p:clrMapOvr>
+    <a:masterClrMapping/>
+  </p:clrMapOvr>
+</p:sld>
+</file>
+
+<file path=ppt/slides/slide12.xml><?xml version="1.0" encoding="utf-8"?>
+<p:sld xmlns:a="http://schemas.openxmlformats.org/drawingml/2006/main" xmlns:r="http://schemas.openxmlformats.org/officeDocument/2006/relationships" xmlns:p="http://schemas.openxmlformats.org/presentationml/2006/main">
+  <p:cSld>
+    <p:spTree>
+      <p:nvGrpSpPr>
+        <p:cNvPr id="1" name=""/>
+        <p:cNvGrpSpPr/>
+        <p:nvPr/>
+      </p:nvGrpSpPr>
+      <p:grpSpPr>
+        <a:xfrm>
+          <a:off x="0" y="0"/>
+          <a:ext cx="0" cy="0"/>
+          <a:chOff x="0" y="0"/>
+          <a:chExt cx="0" cy="0"/>
+        </a:xfrm>
+      </p:grpSpPr>
+      <p:sp>
+        <p:nvSpPr>
+          <p:cNvPr id="2" name="Title 1">
+            <a:extLst>
+              <a:ext uri="{FF2B5EF4-FFF2-40B4-BE49-F238E27FC236}">
+                <a16:creationId xmlns:a16="http://schemas.microsoft.com/office/drawing/2014/main" id="{FA472276-446E-44DF-BE4B-829383AC16CB}"/>
+              </a:ext>
+            </a:extLst>
+          </p:cNvPr>
+          <p:cNvSpPr>
+            <a:spLocks noGrp="1"/>
+          </p:cNvSpPr>
+          <p:nvPr>
+            <p:ph type="title"/>
+          </p:nvPr>
+        </p:nvSpPr>
+        <p:spPr>
+          <a:xfrm>
+            <a:off x="1484311" y="685800"/>
+            <a:ext cx="10018713" cy="1752599"/>
+          </a:xfrm>
+        </p:spPr>
+        <p:txBody>
+          <a:bodyPr/>
+          <a:lstStyle/>
+          <a:p>
+            <a:r>
+              <a:rPr lang="en-ZA"/>
+              <a:t>Thank You, Any Questions ?</a:t>
+            </a:r>
+            <a:endParaRPr lang="en-ZA" dirty="0"/>
+          </a:p>
+        </p:txBody>
+      </p:sp>
+      <p:pic>
+        <p:nvPicPr>
+          <p:cNvPr id="31" name="Content Placeholder 30">
+            <a:extLst>
+              <a:ext uri="{FF2B5EF4-FFF2-40B4-BE49-F238E27FC236}">
+                <a16:creationId xmlns:a16="http://schemas.microsoft.com/office/drawing/2014/main" id="{BE79E663-54F8-4C87-9EDB-AABE93CD7F40}"/>
+              </a:ext>
+            </a:extLst>
+          </p:cNvPr>
+          <p:cNvPicPr>
+            <a:picLocks noGrp="1" noChangeAspect="1"/>
+          </p:cNvPicPr>
+          <p:nvPr>
+            <p:ph idx="1"/>
+          </p:nvPr>
+        </p:nvPicPr>
+        <p:blipFill>
+          <a:blip r:embed="rId2">
+            <a:extLst>
+              <a:ext uri="{28A0092B-C50C-407E-A947-70E740481C1C}">
+                <a14:useLocalDpi xmlns:a14="http://schemas.microsoft.com/office/drawing/2010/main" val="0"/>
+              </a:ext>
+            </a:extLst>
+          </a:blip>
+          <a:stretch>
+            <a:fillRect/>
+          </a:stretch>
+        </p:blipFill>
+        <p:spPr>
+          <a:xfrm>
+            <a:off x="1846555" y="2128604"/>
+            <a:ext cx="8666125" cy="3917089"/>
+          </a:xfrm>
+          <a:prstGeom prst="rect">
+            <a:avLst/>
+          </a:prstGeom>
+          <a:solidFill>
+            <a:srgbClr val="FFFFFF">
+              <a:shade val="85000"/>
+            </a:srgbClr>
+          </a:solidFill>
+          <a:ln w="190500" cap="rnd">
+            <a:solidFill>
+              <a:srgbClr val="FFFFFF"/>
+            </a:solidFill>
+          </a:ln>
+          <a:effectLst>
+            <a:outerShdw blurRad="50000" algn="tl" rotWithShape="0">
+              <a:srgbClr val="000000">
+                <a:alpha val="41000"/>
+              </a:srgbClr>
+            </a:outerShdw>
+          </a:effectLst>
+          <a:scene3d>
+            <a:camera prst="orthographicFront"/>
+            <a:lightRig rig="twoPt" dir="t">
+              <a:rot lat="0" lon="0" rev="7800000"/>
+            </a:lightRig>
+          </a:scene3d>
+          <a:sp3d contourW="6350">
+            <a:bevelT w="50800" h="16510"/>
+            <a:contourClr>
+              <a:srgbClr val="C0C0C0"/>
+            </a:contourClr>
+          </a:sp3d>
+        </p:spPr>
+      </p:pic>
+    </p:spTree>
+    <p:extLst>
+      <p:ext uri="{BB962C8B-B14F-4D97-AF65-F5344CB8AC3E}">
+        <p14:creationId xmlns:p14="http://schemas.microsoft.com/office/powerpoint/2010/main" val="1659557539"/>
+      </p:ext>
+    </p:extLst>
+  </p:cSld>
+  <p:clrMapOvr>
+    <a:masterClrMapping/>
+  </p:clrMapOvr>
+</p:sld>
+</file>
+
+<file path=ppt/slides/slide2.xml><?xml version="1.0" encoding="utf-8"?>
+<p:sld xmlns:a="http://schemas.openxmlformats.org/drawingml/2006/main" xmlns:r="http://schemas.openxmlformats.org/officeDocument/2006/relationships" xmlns:p="http://schemas.openxmlformats.org/presentationml/2006/main">
+  <p:cSld>
+    <p:spTree>
+      <p:nvGrpSpPr>
+        <p:cNvPr id="1" name=""/>
+        <p:cNvGrpSpPr/>
+        <p:nvPr/>
+      </p:nvGrpSpPr>
+      <p:grpSpPr>
+        <a:xfrm>
+          <a:off x="0" y="0"/>
+          <a:ext cx="0" cy="0"/>
+          <a:chOff x="0" y="0"/>
+          <a:chExt cx="0" cy="0"/>
+        </a:xfrm>
+      </p:grpSpPr>
+      <p:sp>
+        <p:nvSpPr>
+          <p:cNvPr id="2" name="Title 1">
+            <a:extLst>
+              <a:ext uri="{FF2B5EF4-FFF2-40B4-BE49-F238E27FC236}">
+                <a16:creationId xmlns:a16="http://schemas.microsoft.com/office/drawing/2014/main" id="{78C57B85-2A41-40E0-B660-9299A818A91F}"/>
+              </a:ext>
+            </a:extLst>
+          </p:cNvPr>
+          <p:cNvSpPr>
+            <a:spLocks noGrp="1"/>
+          </p:cNvSpPr>
+          <p:nvPr>
+            <p:ph type="title"/>
+          </p:nvPr>
+        </p:nvSpPr>
+        <p:spPr>
+          <a:xfrm>
+            <a:off x="1349407" y="685800"/>
+            <a:ext cx="10153618" cy="965447"/>
+          </a:xfrm>
+        </p:spPr>
+        <p:txBody>
+          <a:bodyPr>
+            <a:normAutofit/>
+          </a:bodyPr>
+          <a:lstStyle/>
+          <a:p>
+            <a:r>
+              <a:rPr lang="en-ZA" sz="4800" dirty="0"/>
+              <a:t>Meet The Team</a:t>
+            </a:r>
+          </a:p>
+        </p:txBody>
+      </p:sp>
+      <p:sp>
+        <p:nvSpPr>
+          <p:cNvPr id="3" name="Content Placeholder 2">
+            <a:extLst>
+              <a:ext uri="{FF2B5EF4-FFF2-40B4-BE49-F238E27FC236}">
+                <a16:creationId xmlns:a16="http://schemas.microsoft.com/office/drawing/2014/main" id="{F86524F0-E84D-4223-8D55-93C68249AF82}"/>
+              </a:ext>
+            </a:extLst>
+          </p:cNvPr>
+          <p:cNvSpPr>
+            <a:spLocks noGrp="1"/>
+          </p:cNvSpPr>
+          <p:nvPr>
+            <p:ph idx="1"/>
+          </p:nvPr>
+        </p:nvSpPr>
+        <p:spPr>
+          <a:xfrm>
+            <a:off x="1242875" y="2658121"/>
+            <a:ext cx="10464336" cy="3281040"/>
+          </a:xfrm>
+        </p:spPr>
+        <p:txBody>
+          <a:bodyPr>
+            <a:normAutofit fontScale="92500" lnSpcReduction="10000"/>
+          </a:bodyPr>
+          <a:lstStyle/>
+          <a:p>
+            <a:r>
+              <a:rPr lang="en-ZA" dirty="0" err="1"/>
+              <a:t>Wian</a:t>
+            </a:r>
+            <a:r>
+              <a:rPr lang="en-ZA" dirty="0"/>
+              <a:t> du Plooy </a:t>
+            </a:r>
+            <a:r>
+              <a:rPr lang="en-ZA" sz="1800" dirty="0"/>
+              <a:t>(</a:t>
+            </a:r>
+            <a:r>
+              <a:rPr lang="en-ZA" sz="1800" dirty="0">
+                <a:latin typeface="Arial" panose="020B0604020202020204" pitchFamily="34" charset="0"/>
+                <a:cs typeface="Arial" panose="020B0604020202020204" pitchFamily="34" charset="0"/>
+              </a:rPr>
+              <a:t>u17237263</a:t>
+            </a:r>
+            <a:r>
+              <a:rPr lang="en-ZA" sz="1800" dirty="0"/>
+              <a:t>) -  </a:t>
+            </a:r>
+            <a:r>
+              <a:rPr lang="en-ZA" sz="2000" dirty="0"/>
+              <a:t>Team Leader – Working Prototype</a:t>
+            </a:r>
+            <a:endParaRPr lang="en-ZA" sz="1800" dirty="0"/>
+          </a:p>
+          <a:p>
+            <a:r>
+              <a:rPr lang="en-ZA" dirty="0"/>
+              <a:t>Duncan Vodden </a:t>
+            </a:r>
+            <a:r>
+              <a:rPr lang="en-ZA" sz="1800" dirty="0"/>
+              <a:t>(</a:t>
+            </a:r>
+            <a:r>
+              <a:rPr lang="en-ZA" sz="1800" dirty="0">
+                <a:latin typeface="Arial" panose="020B0604020202020204" pitchFamily="34" charset="0"/>
+                <a:cs typeface="Arial" panose="020B0604020202020204" pitchFamily="34" charset="0"/>
+              </a:rPr>
+              <a:t>u17037400</a:t>
+            </a:r>
+            <a:r>
+              <a:rPr lang="en-ZA" sz="1800" dirty="0"/>
+              <a:t>) -  </a:t>
+            </a:r>
+            <a:r>
+              <a:rPr lang="en-ZA" sz="2000" dirty="0"/>
+              <a:t>Team Member –</a:t>
+            </a:r>
+            <a:r>
+              <a:rPr lang="en-ZA" sz="1800" dirty="0"/>
+              <a:t> </a:t>
+            </a:r>
+            <a:r>
+              <a:rPr lang="en-ZA" sz="2000" dirty="0"/>
+              <a:t>Landing Page, Slide Show, Subsystems (SRS) and Trace-ability Matrix</a:t>
+            </a:r>
+            <a:endParaRPr lang="en-ZA" sz="1800" dirty="0"/>
+          </a:p>
+          <a:p>
+            <a:r>
+              <a:rPr lang="en-ZA" dirty="0" err="1"/>
+              <a:t>Tjaart</a:t>
+            </a:r>
+            <a:r>
+              <a:rPr lang="en-ZA" dirty="0"/>
+              <a:t> </a:t>
+            </a:r>
+            <a:r>
+              <a:rPr lang="en-ZA" dirty="0" err="1"/>
+              <a:t>Booyens</a:t>
+            </a:r>
+            <a:r>
+              <a:rPr lang="en-ZA" dirty="0"/>
+              <a:t> </a:t>
+            </a:r>
+            <a:r>
+              <a:rPr lang="en-ZA" sz="1800" dirty="0"/>
+              <a:t>(</a:t>
+            </a:r>
+            <a:r>
+              <a:rPr lang="en-ZA" sz="1800" dirty="0">
+                <a:latin typeface="Arial" panose="020B0604020202020204" pitchFamily="34" charset="0"/>
+                <a:cs typeface="Arial" panose="020B0604020202020204" pitchFamily="34" charset="0"/>
+              </a:rPr>
+              <a:t>u17021775</a:t>
+            </a:r>
+            <a:r>
+              <a:rPr lang="en-ZA" sz="1800" dirty="0"/>
+              <a:t>) -  </a:t>
+            </a:r>
+            <a:r>
+              <a:rPr lang="en-ZA" sz="2000" dirty="0"/>
+              <a:t>Team Member –</a:t>
+            </a:r>
+            <a:r>
+              <a:rPr lang="en-ZA" sz="1800" dirty="0"/>
+              <a:t> </a:t>
+            </a:r>
+            <a:r>
+              <a:rPr lang="en-ZA" sz="2100" dirty="0"/>
+              <a:t>User Characteristics, Subsystems (SRS), Quality requirements  and Trace-ability Matrix</a:t>
+            </a:r>
+          </a:p>
+          <a:p>
+            <a:r>
+              <a:rPr lang="en-ZA" dirty="0" err="1"/>
+              <a:t>Savvas</a:t>
+            </a:r>
+            <a:r>
+              <a:rPr lang="en-ZA" dirty="0"/>
+              <a:t> </a:t>
+            </a:r>
+            <a:r>
+              <a:rPr lang="en-ZA" dirty="0" err="1"/>
+              <a:t>Panagiotou</a:t>
+            </a:r>
+            <a:r>
+              <a:rPr lang="en-ZA" dirty="0"/>
+              <a:t> </a:t>
+            </a:r>
+            <a:r>
+              <a:rPr lang="en-ZA" sz="1800" dirty="0"/>
+              <a:t>(</a:t>
+            </a:r>
+            <a:r>
+              <a:rPr lang="en-ZA" sz="1800" dirty="0">
+                <a:latin typeface="Arial" panose="020B0604020202020204" pitchFamily="34" charset="0"/>
+                <a:cs typeface="Arial" panose="020B0604020202020204" pitchFamily="34" charset="0"/>
+              </a:rPr>
+              <a:t>17215286</a:t>
+            </a:r>
+            <a:r>
+              <a:rPr lang="en-ZA" sz="1800" dirty="0"/>
+              <a:t>) -  </a:t>
+            </a:r>
+            <a:r>
+              <a:rPr lang="en-ZA" sz="2000" dirty="0"/>
+              <a:t>Team Member – Use Cases</a:t>
+            </a:r>
+            <a:endParaRPr lang="en-ZA" sz="2800" dirty="0"/>
+          </a:p>
+          <a:p>
+            <a:r>
+              <a:rPr lang="en-ZA" dirty="0"/>
+              <a:t>Jared O’Reilly </a:t>
+            </a:r>
+            <a:r>
+              <a:rPr lang="en-ZA" sz="1800" dirty="0"/>
+              <a:t>(</a:t>
+            </a:r>
+            <a:r>
+              <a:rPr lang="en-ZA" sz="1800" dirty="0">
+                <a:latin typeface="Arial" panose="020B0604020202020204" pitchFamily="34" charset="0"/>
+                <a:cs typeface="Arial" panose="020B0604020202020204" pitchFamily="34" charset="0"/>
+              </a:rPr>
+              <a:t>17051429</a:t>
+            </a:r>
+            <a:r>
+              <a:rPr lang="en-ZA" sz="1800" dirty="0"/>
+              <a:t>) -  </a:t>
+            </a:r>
+            <a:r>
+              <a:rPr lang="en-ZA" sz="2000" dirty="0"/>
+              <a:t>Team Member – Introduction, Domain Model and functional Requirements</a:t>
+            </a:r>
+            <a:endParaRPr lang="en-ZA" sz="1800" dirty="0"/>
+          </a:p>
+          <a:p>
+            <a:endParaRPr lang="en-ZA" dirty="0"/>
+          </a:p>
+          <a:p>
+            <a:endParaRPr lang="en-ZA" dirty="0"/>
+          </a:p>
+          <a:p>
+            <a:endParaRPr lang="en-ZA" dirty="0"/>
+          </a:p>
+        </p:txBody>
+      </p:sp>
+    </p:spTree>
+    <p:extLst>
+      <p:ext uri="{BB962C8B-B14F-4D97-AF65-F5344CB8AC3E}">
+        <p14:creationId xmlns:p14="http://schemas.microsoft.com/office/powerpoint/2010/main" val="1770318370"/>
+      </p:ext>
+    </p:extLst>
+  </p:cSld>
+  <p:clrMapOvr>
+    <a:masterClrMapping/>
+  </p:clrMapOvr>
+</p:sld>
+</file>
+
+<file path=ppt/slides/slide3.xml><?xml version="1.0" encoding="utf-8"?>
+<p:sld xmlns:a="http://schemas.openxmlformats.org/drawingml/2006/main" xmlns:r="http://schemas.openxmlformats.org/officeDocument/2006/relationships" xmlns:p="http://schemas.openxmlformats.org/presentationml/2006/main">
+  <p:cSld>
+    <p:spTree>
+      <p:nvGrpSpPr>
+        <p:cNvPr id="1" name=""/>
+        <p:cNvGrpSpPr/>
+        <p:nvPr/>
+      </p:nvGrpSpPr>
+      <p:grpSpPr>
+        <a:xfrm>
+          <a:off x="0" y="0"/>
+          <a:ext cx="0" cy="0"/>
+          <a:chOff x="0" y="0"/>
+          <a:chExt cx="0" cy="0"/>
+        </a:xfrm>
+      </p:grpSpPr>
+      <p:sp>
+        <p:nvSpPr>
+          <p:cNvPr id="2" name="Title 1">
+            <a:extLst>
+              <a:ext uri="{FF2B5EF4-FFF2-40B4-BE49-F238E27FC236}">
+                <a16:creationId xmlns:a16="http://schemas.microsoft.com/office/drawing/2014/main" id="{F7CD3D28-A0E5-4BDE-A8B6-A8714CC3680B}"/>
+              </a:ext>
+            </a:extLst>
+          </p:cNvPr>
+          <p:cNvSpPr>
+            <a:spLocks noGrp="1"/>
+          </p:cNvSpPr>
+          <p:nvPr>
+            <p:ph type="title"/>
+          </p:nvPr>
+        </p:nvSpPr>
+        <p:spPr>
+          <a:xfrm>
+            <a:off x="1484311" y="685801"/>
+            <a:ext cx="10018713" cy="1314450"/>
+          </a:xfrm>
+        </p:spPr>
+        <p:txBody>
+          <a:bodyPr>
+            <a:normAutofit/>
+          </a:bodyPr>
+          <a:lstStyle/>
+          <a:p>
+            <a:r>
+              <a:rPr lang="en-ZA" sz="4800" dirty="0"/>
+              <a:t>Project Description</a:t>
+            </a:r>
+          </a:p>
+        </p:txBody>
+      </p:sp>
+      <p:sp>
+        <p:nvSpPr>
+          <p:cNvPr id="4" name="Content Placeholder 3">
+            <a:extLst>
+              <a:ext uri="{FF2B5EF4-FFF2-40B4-BE49-F238E27FC236}">
+                <a16:creationId xmlns:a16="http://schemas.microsoft.com/office/drawing/2014/main" id="{D614D2FB-7963-4305-BD43-452203CF5B52}"/>
+              </a:ext>
+            </a:extLst>
+          </p:cNvPr>
+          <p:cNvSpPr>
+            <a:spLocks noGrp="1"/>
+          </p:cNvSpPr>
+          <p:nvPr>
+            <p:ph sz="half" idx="2"/>
+          </p:nvPr>
+        </p:nvSpPr>
+        <p:spPr>
+          <a:xfrm>
+            <a:off x="4030463" y="2000250"/>
+            <a:ext cx="7563052" cy="4462693"/>
+          </a:xfrm>
+        </p:spPr>
+        <p:txBody>
+          <a:bodyPr>
+            <a:normAutofit/>
+          </a:bodyPr>
+          <a:lstStyle/>
+          <a:p>
+            <a:r>
+              <a:rPr lang="en-ZA" sz="2000" dirty="0"/>
+              <a:t>Our Smart NFC application is aimed to maximize the use of NFC technology in the office environment</a:t>
+            </a:r>
+          </a:p>
+          <a:p>
+            <a:r>
+              <a:rPr lang="en-ZA" sz="2000" dirty="0"/>
+              <a:t>Business card details as well as the location of the business which will open the location</a:t>
+            </a:r>
+          </a:p>
+          <a:p>
+            <a:r>
+              <a:rPr lang="en-ZA" sz="2000" dirty="0"/>
+              <a:t>Allow guests to have temporary access control to a businesses property</a:t>
+            </a:r>
+          </a:p>
+          <a:p>
+            <a:r>
+              <a:rPr lang="en-ZA" sz="2000" dirty="0"/>
+              <a:t>The app will also allow the sharing of Wi-Fi details in order for guests to connect to the Wi-Fi of a business</a:t>
+            </a:r>
+          </a:p>
+          <a:p>
+            <a:r>
+              <a:rPr lang="en-ZA" sz="2000" dirty="0"/>
+              <a:t>Allows users to load credits onto a employee/guests account in the purpose of in-office purchases for cashless transactions.</a:t>
+            </a:r>
+          </a:p>
+        </p:txBody>
+      </p:sp>
+      <p:pic>
+        <p:nvPicPr>
+          <p:cNvPr id="10" name="Content Placeholder 9" descr="A black sign with white text&#10;&#10;Description automatically generated">
+            <a:extLst>
+              <a:ext uri="{FF2B5EF4-FFF2-40B4-BE49-F238E27FC236}">
+                <a16:creationId xmlns:a16="http://schemas.microsoft.com/office/drawing/2014/main" id="{CBBD05C2-F777-4024-A3B3-A8242824542F}"/>
+              </a:ext>
+            </a:extLst>
+          </p:cNvPr>
+          <p:cNvPicPr>
+            <a:picLocks noGrp="1" noChangeAspect="1"/>
+          </p:cNvPicPr>
+          <p:nvPr>
+            <p:ph sz="half" idx="1"/>
+          </p:nvPr>
+        </p:nvPicPr>
+        <p:blipFill>
+          <a:blip r:embed="rId2">
+            <a:extLst>
+              <a:ext uri="{28A0092B-C50C-407E-A947-70E740481C1C}">
+                <a14:useLocalDpi xmlns:a14="http://schemas.microsoft.com/office/drawing/2010/main" val="0"/>
+              </a:ext>
+            </a:extLst>
+          </a:blip>
+          <a:stretch>
+            <a:fillRect/>
+          </a:stretch>
+        </p:blipFill>
+        <p:spPr>
+          <a:xfrm>
+            <a:off x="-65287" y="1757594"/>
+            <a:ext cx="4095750" cy="4095750"/>
+          </a:xfrm>
+        </p:spPr>
+      </p:pic>
+    </p:spTree>
+    <p:extLst>
+      <p:ext uri="{BB962C8B-B14F-4D97-AF65-F5344CB8AC3E}">
+        <p14:creationId xmlns:p14="http://schemas.microsoft.com/office/powerpoint/2010/main" val="4054940111"/>
+      </p:ext>
+    </p:extLst>
+  </p:cSld>
+  <p:clrMapOvr>
+    <a:masterClrMapping/>
+  </p:clrMapOvr>
+</p:sld>
+</file>
+
+<file path=ppt/slides/slide4.xml><?xml version="1.0" encoding="utf-8"?>
+<p:sld xmlns:a="http://schemas.openxmlformats.org/drawingml/2006/main" xmlns:r="http://schemas.openxmlformats.org/officeDocument/2006/relationships" xmlns:p="http://schemas.openxmlformats.org/presentationml/2006/main">
+  <p:cSld>
+    <p:spTree>
+      <p:nvGrpSpPr>
+        <p:cNvPr id="1" name=""/>
+        <p:cNvGrpSpPr/>
+        <p:nvPr/>
+      </p:nvGrpSpPr>
+      <p:grpSpPr>
+        <a:xfrm>
+          <a:off x="0" y="0"/>
+          <a:ext cx="0" cy="0"/>
+          <a:chOff x="0" y="0"/>
+          <a:chExt cx="0" cy="0"/>
+        </a:xfrm>
+      </p:grpSpPr>
+      <p:sp>
+        <p:nvSpPr>
+          <p:cNvPr id="2" name="Title 1">
+            <a:extLst>
+              <a:ext uri="{FF2B5EF4-FFF2-40B4-BE49-F238E27FC236}">
                 <a16:creationId xmlns:a16="http://schemas.microsoft.com/office/drawing/2014/main" id="{9F86B53F-CC6F-4766-A527-816D21D94DC1}"/>
               </a:ext>
             </a:extLst>
@@ -6211,6 +7089,3115 @@
     <p:extLst>
       <p:ext uri="{BB962C8B-B14F-4D97-AF65-F5344CB8AC3E}">
         <p14:creationId xmlns:p14="http://schemas.microsoft.com/office/powerpoint/2010/main" val="2584859191"/>
+      </p:ext>
+    </p:extLst>
+  </p:cSld>
+  <p:clrMapOvr>
+    <a:masterClrMapping/>
+  </p:clrMapOvr>
+</p:sld>
+</file>
+
+<file path=ppt/slides/slide5.xml><?xml version="1.0" encoding="utf-8"?>
+<p:sld xmlns:a="http://schemas.openxmlformats.org/drawingml/2006/main" xmlns:r="http://schemas.openxmlformats.org/officeDocument/2006/relationships" xmlns:p="http://schemas.openxmlformats.org/presentationml/2006/main">
+  <p:cSld>
+    <p:bg>
+      <p:bgPr>
+        <a:blipFill rotWithShape="1">
+          <a:blip r:embed="rId2">
+            <a:duotone>
+              <a:schemeClr val="bg2">
+                <a:shade val="76000"/>
+                <a:satMod val="180000"/>
+              </a:schemeClr>
+              <a:schemeClr val="bg2">
+                <a:tint val="80000"/>
+                <a:satMod val="120000"/>
+                <a:lumMod val="180000"/>
+              </a:schemeClr>
+            </a:duotone>
+            <a:extLst/>
+          </a:blip>
+          <a:stretch/>
+        </a:blipFill>
+        <a:effectLst/>
+      </p:bgPr>
+    </p:bg>
+    <p:spTree>
+      <p:nvGrpSpPr>
+        <p:cNvPr id="1" name=""/>
+        <p:cNvGrpSpPr/>
+        <p:nvPr/>
+      </p:nvGrpSpPr>
+      <p:grpSpPr>
+        <a:xfrm>
+          <a:off x="0" y="0"/>
+          <a:ext cx="0" cy="0"/>
+          <a:chOff x="0" y="0"/>
+          <a:chExt cx="0" cy="0"/>
+        </a:xfrm>
+      </p:grpSpPr>
+      <p:grpSp>
+        <p:nvGrpSpPr>
+          <p:cNvPr id="11" name="Group 10">
+            <a:extLst>
+              <a:ext uri="{FF2B5EF4-FFF2-40B4-BE49-F238E27FC236}">
+                <a16:creationId xmlns:a16="http://schemas.microsoft.com/office/drawing/2014/main" id="{15FF890B-3CE7-403A-AECE-2DE04FC7AF80}"/>
+              </a:ext>
+              <a:ext uri="{C183D7F6-B498-43B3-948B-1728B52AA6E4}">
+                <adec:decorative xmlns:adec="http://schemas.microsoft.com/office/drawing/2017/decorative" val="1"/>
+              </a:ext>
+            </a:extLst>
+          </p:cNvPr>
+          <p:cNvGrpSpPr>
+            <a:grpSpLocks noGrp="1" noUngrp="1" noRot="1" noChangeAspect="1" noMove="1" noResize="1"/>
+          </p:cNvGrpSpPr>
+          <p:nvPr>
+            <p:extLst>
+              <p:ext uri="{386F3935-93C4-4BCD-93E2-E3B085C9AB24}">
+                <p16:designElem xmlns:p16="http://schemas.microsoft.com/office/powerpoint/2015/main" val="1"/>
+              </p:ext>
+            </p:extLst>
+          </p:nvPr>
+        </p:nvGrpSpPr>
+        <p:grpSpPr>
+          <a:xfrm>
+            <a:off x="150812" y="0"/>
+            <a:ext cx="2436813" cy="6858001"/>
+            <a:chOff x="1320800" y="0"/>
+            <a:chExt cx="2436813" cy="6858001"/>
+          </a:xfrm>
+        </p:grpSpPr>
+        <p:sp>
+          <p:nvSpPr>
+            <p:cNvPr id="12" name="Freeform 6">
+              <a:extLst>
+                <a:ext uri="{FF2B5EF4-FFF2-40B4-BE49-F238E27FC236}">
+                  <a16:creationId xmlns:a16="http://schemas.microsoft.com/office/drawing/2014/main" id="{99A4E160-6CFD-4514-9E20-CA6692CCDB9C}"/>
+                </a:ext>
+                <a:ext uri="{C183D7F6-B498-43B3-948B-1728B52AA6E4}">
+                  <adec:decorative xmlns:adec="http://schemas.microsoft.com/office/drawing/2017/decorative" val="1"/>
+                </a:ext>
+              </a:extLst>
+            </p:cNvPr>
+            <p:cNvSpPr/>
+            <p:nvPr>
+              <p:extLst>
+                <p:ext uri="{386F3935-93C4-4BCD-93E2-E3B085C9AB24}">
+                  <p16:designElem xmlns:p16="http://schemas.microsoft.com/office/powerpoint/2015/main" val="1"/>
+                </p:ext>
+              </p:extLst>
+            </p:nvPr>
+          </p:nvSpPr>
+          <p:spPr bwMode="auto">
+            <a:xfrm>
+              <a:off x="1627188" y="0"/>
+              <a:ext cx="1122363" cy="5329238"/>
+            </a:xfrm>
+            <a:custGeom>
+              <a:avLst/>
+              <a:gdLst/>
+              <a:ahLst/>
+              <a:cxnLst/>
+              <a:rect l="0" t="0" r="r" b="b"/>
+              <a:pathLst>
+                <a:path w="707" h="3357">
+                  <a:moveTo>
+                    <a:pt x="0" y="3330"/>
+                  </a:moveTo>
+                  <a:lnTo>
+                    <a:pt x="156" y="3357"/>
+                  </a:lnTo>
+                  <a:lnTo>
+                    <a:pt x="707" y="0"/>
+                  </a:lnTo>
+                  <a:lnTo>
+                    <a:pt x="547" y="0"/>
+                  </a:lnTo>
+                  <a:lnTo>
+                    <a:pt x="0" y="3330"/>
+                  </a:lnTo>
+                  <a:close/>
+                </a:path>
+              </a:pathLst>
+            </a:custGeom>
+            <a:solidFill>
+              <a:schemeClr val="accent1"/>
+            </a:solidFill>
+            <a:ln>
+              <a:noFill/>
+            </a:ln>
+          </p:spPr>
+        </p:sp>
+        <p:sp>
+          <p:nvSpPr>
+            <p:cNvPr id="13" name="Freeform 7">
+              <a:extLst>
+                <a:ext uri="{FF2B5EF4-FFF2-40B4-BE49-F238E27FC236}">
+                  <a16:creationId xmlns:a16="http://schemas.microsoft.com/office/drawing/2014/main" id="{3DCD16F5-8D15-45FD-BA62-ADAC08183A27}"/>
+                </a:ext>
+                <a:ext uri="{C183D7F6-B498-43B3-948B-1728B52AA6E4}">
+                  <adec:decorative xmlns:adec="http://schemas.microsoft.com/office/drawing/2017/decorative" val="1"/>
+                </a:ext>
+              </a:extLst>
+            </p:cNvPr>
+            <p:cNvSpPr/>
+            <p:nvPr>
+              <p:extLst>
+                <p:ext uri="{386F3935-93C4-4BCD-93E2-E3B085C9AB24}">
+                  <p16:designElem xmlns:p16="http://schemas.microsoft.com/office/powerpoint/2015/main" val="1"/>
+                </p:ext>
+              </p:extLst>
+            </p:nvPr>
+          </p:nvSpPr>
+          <p:spPr bwMode="auto">
+            <a:xfrm>
+              <a:off x="1320800" y="0"/>
+              <a:ext cx="1117600" cy="5276850"/>
+            </a:xfrm>
+            <a:custGeom>
+              <a:avLst/>
+              <a:gdLst/>
+              <a:ahLst/>
+              <a:cxnLst/>
+              <a:rect l="0" t="0" r="r" b="b"/>
+              <a:pathLst>
+                <a:path w="704" h="3324">
+                  <a:moveTo>
+                    <a:pt x="704" y="0"/>
+                  </a:moveTo>
+                  <a:lnTo>
+                    <a:pt x="545" y="0"/>
+                  </a:lnTo>
+                  <a:lnTo>
+                    <a:pt x="0" y="3300"/>
+                  </a:lnTo>
+                  <a:lnTo>
+                    <a:pt x="157" y="3324"/>
+                  </a:lnTo>
+                  <a:lnTo>
+                    <a:pt x="704" y="0"/>
+                  </a:lnTo>
+                  <a:close/>
+                </a:path>
+              </a:pathLst>
+            </a:custGeom>
+            <a:solidFill>
+              <a:schemeClr val="tx1">
+                <a:lumMod val="65000"/>
+                <a:lumOff val="35000"/>
+              </a:schemeClr>
+            </a:solidFill>
+            <a:ln>
+              <a:noFill/>
+            </a:ln>
+          </p:spPr>
+        </p:sp>
+        <p:sp>
+          <p:nvSpPr>
+            <p:cNvPr id="14" name="Freeform 8">
+              <a:extLst>
+                <a:ext uri="{FF2B5EF4-FFF2-40B4-BE49-F238E27FC236}">
+                  <a16:creationId xmlns:a16="http://schemas.microsoft.com/office/drawing/2014/main" id="{E7CFAF28-6FDA-4C2C-BE51-123D1115F75C}"/>
+                </a:ext>
+                <a:ext uri="{C183D7F6-B498-43B3-948B-1728B52AA6E4}">
+                  <adec:decorative xmlns:adec="http://schemas.microsoft.com/office/drawing/2017/decorative" val="1"/>
+                </a:ext>
+              </a:extLst>
+            </p:cNvPr>
+            <p:cNvSpPr/>
+            <p:nvPr>
+              <p:extLst>
+                <p:ext uri="{386F3935-93C4-4BCD-93E2-E3B085C9AB24}">
+                  <p16:designElem xmlns:p16="http://schemas.microsoft.com/office/powerpoint/2015/main" val="1"/>
+                </p:ext>
+              </p:extLst>
+            </p:nvPr>
+          </p:nvSpPr>
+          <p:spPr bwMode="auto">
+            <a:xfrm>
+              <a:off x="1320800" y="5238750"/>
+              <a:ext cx="1228725" cy="1619250"/>
+            </a:xfrm>
+            <a:custGeom>
+              <a:avLst/>
+              <a:gdLst/>
+              <a:ahLst/>
+              <a:cxnLst/>
+              <a:rect l="0" t="0" r="r" b="b"/>
+              <a:pathLst>
+                <a:path w="774" h="1020">
+                  <a:moveTo>
+                    <a:pt x="0" y="0"/>
+                  </a:moveTo>
+                  <a:lnTo>
+                    <a:pt x="740" y="1020"/>
+                  </a:lnTo>
+                  <a:lnTo>
+                    <a:pt x="774" y="1020"/>
+                  </a:lnTo>
+                  <a:lnTo>
+                    <a:pt x="0" y="0"/>
+                  </a:lnTo>
+                  <a:close/>
+                </a:path>
+              </a:pathLst>
+            </a:custGeom>
+            <a:solidFill>
+              <a:schemeClr val="tx1">
+                <a:lumMod val="85000"/>
+                <a:lumOff val="15000"/>
+              </a:schemeClr>
+            </a:solidFill>
+            <a:ln>
+              <a:noFill/>
+            </a:ln>
+          </p:spPr>
+        </p:sp>
+        <p:sp>
+          <p:nvSpPr>
+            <p:cNvPr id="15" name="Freeform 9">
+              <a:extLst>
+                <a:ext uri="{FF2B5EF4-FFF2-40B4-BE49-F238E27FC236}">
+                  <a16:creationId xmlns:a16="http://schemas.microsoft.com/office/drawing/2014/main" id="{1FD12703-0627-4991-B2A4-F96519F90863}"/>
+                </a:ext>
+                <a:ext uri="{C183D7F6-B498-43B3-948B-1728B52AA6E4}">
+                  <adec:decorative xmlns:adec="http://schemas.microsoft.com/office/drawing/2017/decorative" val="1"/>
+                </a:ext>
+              </a:extLst>
+            </p:cNvPr>
+            <p:cNvSpPr/>
+            <p:nvPr>
+              <p:extLst>
+                <p:ext uri="{386F3935-93C4-4BCD-93E2-E3B085C9AB24}">
+                  <p16:designElem xmlns:p16="http://schemas.microsoft.com/office/powerpoint/2015/main" val="1"/>
+                </p:ext>
+              </p:extLst>
+            </p:nvPr>
+          </p:nvSpPr>
+          <p:spPr bwMode="auto">
+            <a:xfrm>
+              <a:off x="1627188" y="5291138"/>
+              <a:ext cx="1495425" cy="1566863"/>
+            </a:xfrm>
+            <a:custGeom>
+              <a:avLst/>
+              <a:gdLst/>
+              <a:ahLst/>
+              <a:cxnLst/>
+              <a:rect l="0" t="0" r="r" b="b"/>
+              <a:pathLst>
+                <a:path w="942" h="987">
+                  <a:moveTo>
+                    <a:pt x="0" y="0"/>
+                  </a:moveTo>
+                  <a:lnTo>
+                    <a:pt x="909" y="987"/>
+                  </a:lnTo>
+                  <a:lnTo>
+                    <a:pt x="942" y="987"/>
+                  </a:lnTo>
+                  <a:lnTo>
+                    <a:pt x="0" y="0"/>
+                  </a:lnTo>
+                  <a:close/>
+                </a:path>
+              </a:pathLst>
+            </a:custGeom>
+            <a:solidFill>
+              <a:schemeClr val="accent1">
+                <a:lumMod val="50000"/>
+              </a:schemeClr>
+            </a:solidFill>
+            <a:ln>
+              <a:noFill/>
+            </a:ln>
+          </p:spPr>
+        </p:sp>
+        <p:sp>
+          <p:nvSpPr>
+            <p:cNvPr id="16" name="Freeform 10">
+              <a:extLst>
+                <a:ext uri="{FF2B5EF4-FFF2-40B4-BE49-F238E27FC236}">
+                  <a16:creationId xmlns:a16="http://schemas.microsoft.com/office/drawing/2014/main" id="{A5758E0B-DF61-40A8-B765-BC6841906A9A}"/>
+                </a:ext>
+                <a:ext uri="{C183D7F6-B498-43B3-948B-1728B52AA6E4}">
+                  <adec:decorative xmlns:adec="http://schemas.microsoft.com/office/drawing/2017/decorative" val="1"/>
+                </a:ext>
+              </a:extLst>
+            </p:cNvPr>
+            <p:cNvSpPr/>
+            <p:nvPr>
+              <p:extLst>
+                <p:ext uri="{386F3935-93C4-4BCD-93E2-E3B085C9AB24}">
+                  <p16:designElem xmlns:p16="http://schemas.microsoft.com/office/powerpoint/2015/main" val="1"/>
+                </p:ext>
+              </p:extLst>
+            </p:nvPr>
+          </p:nvSpPr>
+          <p:spPr bwMode="auto">
+            <a:xfrm>
+              <a:off x="1627188" y="5286375"/>
+              <a:ext cx="2130425" cy="1571625"/>
+            </a:xfrm>
+            <a:custGeom>
+              <a:avLst/>
+              <a:gdLst/>
+              <a:ahLst/>
+              <a:cxnLst/>
+              <a:rect l="0" t="0" r="r" b="b"/>
+              <a:pathLst>
+                <a:path w="1342" h="990">
+                  <a:moveTo>
+                    <a:pt x="0" y="3"/>
+                  </a:moveTo>
+                  <a:lnTo>
+                    <a:pt x="942" y="990"/>
+                  </a:lnTo>
+                  <a:lnTo>
+                    <a:pt x="1342" y="990"/>
+                  </a:lnTo>
+                  <a:lnTo>
+                    <a:pt x="156" y="27"/>
+                  </a:lnTo>
+                  <a:lnTo>
+                    <a:pt x="0" y="0"/>
+                  </a:lnTo>
+                  <a:lnTo>
+                    <a:pt x="0" y="3"/>
+                  </a:lnTo>
+                  <a:close/>
+                </a:path>
+              </a:pathLst>
+            </a:custGeom>
+            <a:solidFill>
+              <a:schemeClr val="accent1">
+                <a:lumMod val="75000"/>
+              </a:schemeClr>
+            </a:solidFill>
+            <a:ln>
+              <a:noFill/>
+            </a:ln>
+          </p:spPr>
+        </p:sp>
+        <p:sp>
+          <p:nvSpPr>
+            <p:cNvPr id="17" name="Freeform 11">
+              <a:extLst>
+                <a:ext uri="{FF2B5EF4-FFF2-40B4-BE49-F238E27FC236}">
+                  <a16:creationId xmlns:a16="http://schemas.microsoft.com/office/drawing/2014/main" id="{3E063A1F-9566-4436-B4E3-2890FBBC2CCB}"/>
+                </a:ext>
+                <a:ext uri="{C183D7F6-B498-43B3-948B-1728B52AA6E4}">
+                  <adec:decorative xmlns:adec="http://schemas.microsoft.com/office/drawing/2017/decorative" val="1"/>
+                </a:ext>
+              </a:extLst>
+            </p:cNvPr>
+            <p:cNvSpPr/>
+            <p:nvPr>
+              <p:extLst>
+                <p:ext uri="{386F3935-93C4-4BCD-93E2-E3B085C9AB24}">
+                  <p16:designElem xmlns:p16="http://schemas.microsoft.com/office/powerpoint/2015/main" val="1"/>
+                </p:ext>
+              </p:extLst>
+            </p:nvPr>
+          </p:nvSpPr>
+          <p:spPr bwMode="auto">
+            <a:xfrm>
+              <a:off x="1320800" y="5238750"/>
+              <a:ext cx="1695450" cy="1619250"/>
+            </a:xfrm>
+            <a:custGeom>
+              <a:avLst/>
+              <a:gdLst/>
+              <a:ahLst/>
+              <a:cxnLst/>
+              <a:rect l="0" t="0" r="r" b="b"/>
+              <a:pathLst>
+                <a:path w="1068" h="1020">
+                  <a:moveTo>
+                    <a:pt x="1068" y="1020"/>
+                  </a:moveTo>
+                  <a:lnTo>
+                    <a:pt x="184" y="60"/>
+                  </a:lnTo>
+                  <a:lnTo>
+                    <a:pt x="154" y="27"/>
+                  </a:lnTo>
+                  <a:lnTo>
+                    <a:pt x="157" y="27"/>
+                  </a:lnTo>
+                  <a:lnTo>
+                    <a:pt x="157" y="24"/>
+                  </a:lnTo>
+                  <a:lnTo>
+                    <a:pt x="154" y="24"/>
+                  </a:lnTo>
+                  <a:lnTo>
+                    <a:pt x="0" y="0"/>
+                  </a:lnTo>
+                  <a:lnTo>
+                    <a:pt x="0" y="0"/>
+                  </a:lnTo>
+                  <a:lnTo>
+                    <a:pt x="774" y="1020"/>
+                  </a:lnTo>
+                  <a:lnTo>
+                    <a:pt x="1068" y="1020"/>
+                  </a:lnTo>
+                  <a:close/>
+                </a:path>
+              </a:pathLst>
+            </a:custGeom>
+            <a:solidFill>
+              <a:schemeClr val="tx1">
+                <a:lumMod val="75000"/>
+                <a:lumOff val="25000"/>
+              </a:schemeClr>
+            </a:solidFill>
+            <a:ln>
+              <a:noFill/>
+            </a:ln>
+          </p:spPr>
+        </p:sp>
+      </p:grpSp>
+      <p:grpSp>
+        <p:nvGrpSpPr>
+          <p:cNvPr id="19" name="Group 18">
+            <a:extLst>
+              <a:ext uri="{FF2B5EF4-FFF2-40B4-BE49-F238E27FC236}">
+                <a16:creationId xmlns:a16="http://schemas.microsoft.com/office/drawing/2014/main" id="{9681DF40-19E9-44F1-A30A-33AC0A7047DF}"/>
+              </a:ext>
+              <a:ext uri="{C183D7F6-B498-43B3-948B-1728B52AA6E4}">
+                <adec:decorative xmlns:adec="http://schemas.microsoft.com/office/drawing/2017/decorative" val="1"/>
+              </a:ext>
+            </a:extLst>
+          </p:cNvPr>
+          <p:cNvGrpSpPr>
+            <a:grpSpLocks noGrp="1" noUngrp="1" noRot="1" noChangeAspect="1" noMove="1" noResize="1"/>
+          </p:cNvGrpSpPr>
+          <p:nvPr>
+            <p:extLst>
+              <p:ext uri="{386F3935-93C4-4BCD-93E2-E3B085C9AB24}">
+                <p16:designElem xmlns:p16="http://schemas.microsoft.com/office/powerpoint/2015/main" val="1"/>
+              </p:ext>
+            </p:extLst>
+          </p:nvPr>
+        </p:nvGrpSpPr>
+        <p:grpSpPr>
+          <a:xfrm>
+            <a:off x="150812" y="0"/>
+            <a:ext cx="2436813" cy="6858001"/>
+            <a:chOff x="1320800" y="0"/>
+            <a:chExt cx="2436813" cy="6858001"/>
+          </a:xfrm>
+        </p:grpSpPr>
+        <p:sp>
+          <p:nvSpPr>
+            <p:cNvPr id="20" name="Freeform 6">
+              <a:extLst>
+                <a:ext uri="{FF2B5EF4-FFF2-40B4-BE49-F238E27FC236}">
+                  <a16:creationId xmlns:a16="http://schemas.microsoft.com/office/drawing/2014/main" id="{B5A56C18-147A-4566-B13D-C49A40E3D092}"/>
+                </a:ext>
+                <a:ext uri="{C183D7F6-B498-43B3-948B-1728B52AA6E4}">
+                  <adec:decorative xmlns:adec="http://schemas.microsoft.com/office/drawing/2017/decorative" val="1"/>
+                </a:ext>
+              </a:extLst>
+            </p:cNvPr>
+            <p:cNvSpPr/>
+            <p:nvPr>
+              <p:extLst>
+                <p:ext uri="{386F3935-93C4-4BCD-93E2-E3B085C9AB24}">
+                  <p16:designElem xmlns:p16="http://schemas.microsoft.com/office/powerpoint/2015/main" val="1"/>
+                </p:ext>
+              </p:extLst>
+            </p:nvPr>
+          </p:nvSpPr>
+          <p:spPr bwMode="auto">
+            <a:xfrm>
+              <a:off x="1627188" y="0"/>
+              <a:ext cx="1122363" cy="5329238"/>
+            </a:xfrm>
+            <a:custGeom>
+              <a:avLst/>
+              <a:gdLst/>
+              <a:ahLst/>
+              <a:cxnLst/>
+              <a:rect l="0" t="0" r="r" b="b"/>
+              <a:pathLst>
+                <a:path w="707" h="3357">
+                  <a:moveTo>
+                    <a:pt x="0" y="3330"/>
+                  </a:moveTo>
+                  <a:lnTo>
+                    <a:pt x="156" y="3357"/>
+                  </a:lnTo>
+                  <a:lnTo>
+                    <a:pt x="707" y="0"/>
+                  </a:lnTo>
+                  <a:lnTo>
+                    <a:pt x="547" y="0"/>
+                  </a:lnTo>
+                  <a:lnTo>
+                    <a:pt x="0" y="3330"/>
+                  </a:lnTo>
+                  <a:close/>
+                </a:path>
+              </a:pathLst>
+            </a:custGeom>
+            <a:solidFill>
+              <a:schemeClr val="accent1"/>
+            </a:solidFill>
+            <a:ln>
+              <a:noFill/>
+            </a:ln>
+          </p:spPr>
+        </p:sp>
+        <p:sp>
+          <p:nvSpPr>
+            <p:cNvPr id="21" name="Freeform 7">
+              <a:extLst>
+                <a:ext uri="{FF2B5EF4-FFF2-40B4-BE49-F238E27FC236}">
+                  <a16:creationId xmlns:a16="http://schemas.microsoft.com/office/drawing/2014/main" id="{2FFEA641-7F0D-41D1-A13F-A5A8F7667CBD}"/>
+                </a:ext>
+                <a:ext uri="{C183D7F6-B498-43B3-948B-1728B52AA6E4}">
+                  <adec:decorative xmlns:adec="http://schemas.microsoft.com/office/drawing/2017/decorative" val="1"/>
+                </a:ext>
+              </a:extLst>
+            </p:cNvPr>
+            <p:cNvSpPr/>
+            <p:nvPr>
+              <p:extLst>
+                <p:ext uri="{386F3935-93C4-4BCD-93E2-E3B085C9AB24}">
+                  <p16:designElem xmlns:p16="http://schemas.microsoft.com/office/powerpoint/2015/main" val="1"/>
+                </p:ext>
+              </p:extLst>
+            </p:nvPr>
+          </p:nvSpPr>
+          <p:spPr bwMode="auto">
+            <a:xfrm>
+              <a:off x="1320800" y="0"/>
+              <a:ext cx="1117600" cy="5276850"/>
+            </a:xfrm>
+            <a:custGeom>
+              <a:avLst/>
+              <a:gdLst/>
+              <a:ahLst/>
+              <a:cxnLst/>
+              <a:rect l="0" t="0" r="r" b="b"/>
+              <a:pathLst>
+                <a:path w="704" h="3324">
+                  <a:moveTo>
+                    <a:pt x="704" y="0"/>
+                  </a:moveTo>
+                  <a:lnTo>
+                    <a:pt x="545" y="0"/>
+                  </a:lnTo>
+                  <a:lnTo>
+                    <a:pt x="0" y="3300"/>
+                  </a:lnTo>
+                  <a:lnTo>
+                    <a:pt x="157" y="3324"/>
+                  </a:lnTo>
+                  <a:lnTo>
+                    <a:pt x="704" y="0"/>
+                  </a:lnTo>
+                  <a:close/>
+                </a:path>
+              </a:pathLst>
+            </a:custGeom>
+            <a:solidFill>
+              <a:schemeClr val="tx1">
+                <a:lumMod val="65000"/>
+                <a:lumOff val="35000"/>
+              </a:schemeClr>
+            </a:solidFill>
+            <a:ln>
+              <a:noFill/>
+            </a:ln>
+          </p:spPr>
+        </p:sp>
+        <p:sp>
+          <p:nvSpPr>
+            <p:cNvPr id="22" name="Freeform 8">
+              <a:extLst>
+                <a:ext uri="{FF2B5EF4-FFF2-40B4-BE49-F238E27FC236}">
+                  <a16:creationId xmlns:a16="http://schemas.microsoft.com/office/drawing/2014/main" id="{4D7FF27C-9183-425B-8BAB-7FC5A5B4AB30}"/>
+                </a:ext>
+                <a:ext uri="{C183D7F6-B498-43B3-948B-1728B52AA6E4}">
+                  <adec:decorative xmlns:adec="http://schemas.microsoft.com/office/drawing/2017/decorative" val="1"/>
+                </a:ext>
+              </a:extLst>
+            </p:cNvPr>
+            <p:cNvSpPr/>
+            <p:nvPr>
+              <p:extLst>
+                <p:ext uri="{386F3935-93C4-4BCD-93E2-E3B085C9AB24}">
+                  <p16:designElem xmlns:p16="http://schemas.microsoft.com/office/powerpoint/2015/main" val="1"/>
+                </p:ext>
+              </p:extLst>
+            </p:nvPr>
+          </p:nvSpPr>
+          <p:spPr bwMode="auto">
+            <a:xfrm>
+              <a:off x="1320800" y="5238750"/>
+              <a:ext cx="1228725" cy="1619250"/>
+            </a:xfrm>
+            <a:custGeom>
+              <a:avLst/>
+              <a:gdLst/>
+              <a:ahLst/>
+              <a:cxnLst/>
+              <a:rect l="0" t="0" r="r" b="b"/>
+              <a:pathLst>
+                <a:path w="774" h="1020">
+                  <a:moveTo>
+                    <a:pt x="0" y="0"/>
+                  </a:moveTo>
+                  <a:lnTo>
+                    <a:pt x="740" y="1020"/>
+                  </a:lnTo>
+                  <a:lnTo>
+                    <a:pt x="774" y="1020"/>
+                  </a:lnTo>
+                  <a:lnTo>
+                    <a:pt x="0" y="0"/>
+                  </a:lnTo>
+                  <a:close/>
+                </a:path>
+              </a:pathLst>
+            </a:custGeom>
+            <a:solidFill>
+              <a:schemeClr val="tx1">
+                <a:lumMod val="85000"/>
+                <a:lumOff val="15000"/>
+              </a:schemeClr>
+            </a:solidFill>
+            <a:ln>
+              <a:noFill/>
+            </a:ln>
+          </p:spPr>
+        </p:sp>
+        <p:sp>
+          <p:nvSpPr>
+            <p:cNvPr id="23" name="Freeform 9">
+              <a:extLst>
+                <a:ext uri="{FF2B5EF4-FFF2-40B4-BE49-F238E27FC236}">
+                  <a16:creationId xmlns:a16="http://schemas.microsoft.com/office/drawing/2014/main" id="{A8EF86AB-80F9-40E7-8DC2-DB7FAB5AF8E6}"/>
+                </a:ext>
+                <a:ext uri="{C183D7F6-B498-43B3-948B-1728B52AA6E4}">
+                  <adec:decorative xmlns:adec="http://schemas.microsoft.com/office/drawing/2017/decorative" val="1"/>
+                </a:ext>
+              </a:extLst>
+            </p:cNvPr>
+            <p:cNvSpPr/>
+            <p:nvPr>
+              <p:extLst>
+                <p:ext uri="{386F3935-93C4-4BCD-93E2-E3B085C9AB24}">
+                  <p16:designElem xmlns:p16="http://schemas.microsoft.com/office/powerpoint/2015/main" val="1"/>
+                </p:ext>
+              </p:extLst>
+            </p:nvPr>
+          </p:nvSpPr>
+          <p:spPr bwMode="auto">
+            <a:xfrm>
+              <a:off x="1627188" y="5291138"/>
+              <a:ext cx="1495425" cy="1566863"/>
+            </a:xfrm>
+            <a:custGeom>
+              <a:avLst/>
+              <a:gdLst/>
+              <a:ahLst/>
+              <a:cxnLst/>
+              <a:rect l="0" t="0" r="r" b="b"/>
+              <a:pathLst>
+                <a:path w="942" h="987">
+                  <a:moveTo>
+                    <a:pt x="0" y="0"/>
+                  </a:moveTo>
+                  <a:lnTo>
+                    <a:pt x="909" y="987"/>
+                  </a:lnTo>
+                  <a:lnTo>
+                    <a:pt x="942" y="987"/>
+                  </a:lnTo>
+                  <a:lnTo>
+                    <a:pt x="0" y="0"/>
+                  </a:lnTo>
+                  <a:close/>
+                </a:path>
+              </a:pathLst>
+            </a:custGeom>
+            <a:solidFill>
+              <a:schemeClr val="accent1">
+                <a:lumMod val="50000"/>
+              </a:schemeClr>
+            </a:solidFill>
+            <a:ln>
+              <a:noFill/>
+            </a:ln>
+          </p:spPr>
+        </p:sp>
+        <p:sp>
+          <p:nvSpPr>
+            <p:cNvPr id="24" name="Freeform 10">
+              <a:extLst>
+                <a:ext uri="{FF2B5EF4-FFF2-40B4-BE49-F238E27FC236}">
+                  <a16:creationId xmlns:a16="http://schemas.microsoft.com/office/drawing/2014/main" id="{3BFC2A5D-0701-4890-A2EC-70C2CC287301}"/>
+                </a:ext>
+                <a:ext uri="{C183D7F6-B498-43B3-948B-1728B52AA6E4}">
+                  <adec:decorative xmlns:adec="http://schemas.microsoft.com/office/drawing/2017/decorative" val="1"/>
+                </a:ext>
+              </a:extLst>
+            </p:cNvPr>
+            <p:cNvSpPr/>
+            <p:nvPr>
+              <p:extLst>
+                <p:ext uri="{386F3935-93C4-4BCD-93E2-E3B085C9AB24}">
+                  <p16:designElem xmlns:p16="http://schemas.microsoft.com/office/powerpoint/2015/main" val="1"/>
+                </p:ext>
+              </p:extLst>
+            </p:nvPr>
+          </p:nvSpPr>
+          <p:spPr bwMode="auto">
+            <a:xfrm>
+              <a:off x="1627188" y="5286375"/>
+              <a:ext cx="2130425" cy="1571625"/>
+            </a:xfrm>
+            <a:custGeom>
+              <a:avLst/>
+              <a:gdLst/>
+              <a:ahLst/>
+              <a:cxnLst/>
+              <a:rect l="0" t="0" r="r" b="b"/>
+              <a:pathLst>
+                <a:path w="1342" h="990">
+                  <a:moveTo>
+                    <a:pt x="0" y="3"/>
+                  </a:moveTo>
+                  <a:lnTo>
+                    <a:pt x="942" y="990"/>
+                  </a:lnTo>
+                  <a:lnTo>
+                    <a:pt x="1342" y="990"/>
+                  </a:lnTo>
+                  <a:lnTo>
+                    <a:pt x="156" y="27"/>
+                  </a:lnTo>
+                  <a:lnTo>
+                    <a:pt x="0" y="0"/>
+                  </a:lnTo>
+                  <a:lnTo>
+                    <a:pt x="0" y="3"/>
+                  </a:lnTo>
+                  <a:close/>
+                </a:path>
+              </a:pathLst>
+            </a:custGeom>
+            <a:solidFill>
+              <a:schemeClr val="accent1">
+                <a:lumMod val="75000"/>
+              </a:schemeClr>
+            </a:solidFill>
+            <a:ln>
+              <a:noFill/>
+            </a:ln>
+          </p:spPr>
+        </p:sp>
+        <p:sp>
+          <p:nvSpPr>
+            <p:cNvPr id="25" name="Freeform 11">
+              <a:extLst>
+                <a:ext uri="{FF2B5EF4-FFF2-40B4-BE49-F238E27FC236}">
+                  <a16:creationId xmlns:a16="http://schemas.microsoft.com/office/drawing/2014/main" id="{AA343A51-8CD2-4C41-803E-B3604A310F7C}"/>
+                </a:ext>
+                <a:ext uri="{C183D7F6-B498-43B3-948B-1728B52AA6E4}">
+                  <adec:decorative xmlns:adec="http://schemas.microsoft.com/office/drawing/2017/decorative" val="1"/>
+                </a:ext>
+              </a:extLst>
+            </p:cNvPr>
+            <p:cNvSpPr/>
+            <p:nvPr>
+              <p:extLst>
+                <p:ext uri="{386F3935-93C4-4BCD-93E2-E3B085C9AB24}">
+                  <p16:designElem xmlns:p16="http://schemas.microsoft.com/office/powerpoint/2015/main" val="1"/>
+                </p:ext>
+              </p:extLst>
+            </p:nvPr>
+          </p:nvSpPr>
+          <p:spPr bwMode="auto">
+            <a:xfrm>
+              <a:off x="1320800" y="5238750"/>
+              <a:ext cx="1695450" cy="1619250"/>
+            </a:xfrm>
+            <a:custGeom>
+              <a:avLst/>
+              <a:gdLst/>
+              <a:ahLst/>
+              <a:cxnLst/>
+              <a:rect l="0" t="0" r="r" b="b"/>
+              <a:pathLst>
+                <a:path w="1068" h="1020">
+                  <a:moveTo>
+                    <a:pt x="1068" y="1020"/>
+                  </a:moveTo>
+                  <a:lnTo>
+                    <a:pt x="184" y="60"/>
+                  </a:lnTo>
+                  <a:lnTo>
+                    <a:pt x="154" y="27"/>
+                  </a:lnTo>
+                  <a:lnTo>
+                    <a:pt x="157" y="27"/>
+                  </a:lnTo>
+                  <a:lnTo>
+                    <a:pt x="157" y="24"/>
+                  </a:lnTo>
+                  <a:lnTo>
+                    <a:pt x="154" y="24"/>
+                  </a:lnTo>
+                  <a:lnTo>
+                    <a:pt x="0" y="0"/>
+                  </a:lnTo>
+                  <a:lnTo>
+                    <a:pt x="0" y="0"/>
+                  </a:lnTo>
+                  <a:lnTo>
+                    <a:pt x="774" y="1020"/>
+                  </a:lnTo>
+                  <a:lnTo>
+                    <a:pt x="1068" y="1020"/>
+                  </a:lnTo>
+                  <a:close/>
+                </a:path>
+              </a:pathLst>
+            </a:custGeom>
+            <a:solidFill>
+              <a:schemeClr val="tx1">
+                <a:lumMod val="75000"/>
+                <a:lumOff val="25000"/>
+              </a:schemeClr>
+            </a:solidFill>
+            <a:ln>
+              <a:noFill/>
+            </a:ln>
+          </p:spPr>
+        </p:sp>
+      </p:grpSp>
+      <p:sp>
+        <p:nvSpPr>
+          <p:cNvPr id="2" name="Title 1">
+            <a:extLst>
+              <a:ext uri="{FF2B5EF4-FFF2-40B4-BE49-F238E27FC236}">
+                <a16:creationId xmlns:a16="http://schemas.microsoft.com/office/drawing/2014/main" id="{658FCA8D-E1BC-424D-B7F7-7454CB58256A}"/>
+              </a:ext>
+            </a:extLst>
+          </p:cNvPr>
+          <p:cNvSpPr>
+            <a:spLocks noGrp="1"/>
+          </p:cNvSpPr>
+          <p:nvPr>
+            <p:ph type="title"/>
+          </p:nvPr>
+        </p:nvSpPr>
+        <p:spPr>
+          <a:xfrm>
+            <a:off x="1484311" y="685800"/>
+            <a:ext cx="5781729" cy="1752599"/>
+          </a:xfrm>
+        </p:spPr>
+        <p:txBody>
+          <a:bodyPr vert="horz" lIns="91440" tIns="45720" rIns="91440" bIns="45720" rtlCol="0" anchor="ctr">
+            <a:normAutofit/>
+          </a:bodyPr>
+          <a:lstStyle/>
+          <a:p>
+            <a:r>
+              <a:rPr lang="en-US"/>
+              <a:t>Use Cases and Demo</a:t>
+            </a:r>
+          </a:p>
+        </p:txBody>
+      </p:sp>
+      <p:sp>
+        <p:nvSpPr>
+          <p:cNvPr id="3" name="Content Placeholder 2">
+            <a:extLst>
+              <a:ext uri="{FF2B5EF4-FFF2-40B4-BE49-F238E27FC236}">
+                <a16:creationId xmlns:a16="http://schemas.microsoft.com/office/drawing/2014/main" id="{4EDA786B-4F78-44CD-A352-0FC6ED48FD7C}"/>
+              </a:ext>
+            </a:extLst>
+          </p:cNvPr>
+          <p:cNvSpPr>
+            <a:spLocks noGrp="1"/>
+          </p:cNvSpPr>
+          <p:nvPr>
+            <p:ph sz="half" idx="1"/>
+          </p:nvPr>
+        </p:nvSpPr>
+        <p:spPr>
+          <a:xfrm>
+            <a:off x="1159848" y="1313895"/>
+            <a:ext cx="6163956" cy="4296331"/>
+          </a:xfrm>
+        </p:spPr>
+        <p:txBody>
+          <a:bodyPr vert="horz" lIns="91440" tIns="45720" rIns="91440" bIns="45720" rtlCol="0" anchor="ctr">
+            <a:normAutofit/>
+          </a:bodyPr>
+          <a:lstStyle/>
+          <a:p>
+            <a:pPr marL="0" indent="0" algn="ctr">
+              <a:buNone/>
+            </a:pPr>
+            <a:r>
+              <a:rPr lang="en-US" sz="2800" b="1" dirty="0"/>
+              <a:t>Use Cases for Demo 1</a:t>
+            </a:r>
+          </a:p>
+          <a:p>
+            <a:r>
+              <a:rPr lang="en-US" sz="2000" dirty="0"/>
+              <a:t>Ability to create a Business card </a:t>
+            </a:r>
+          </a:p>
+          <a:p>
+            <a:r>
+              <a:rPr lang="en-US" sz="2000" dirty="0"/>
+              <a:t>Ability to share a business card between phones</a:t>
+            </a:r>
+          </a:p>
+          <a:p>
+            <a:r>
+              <a:rPr lang="en-US" sz="2000" dirty="0"/>
+              <a:t>Ability to View business cards on a phone</a:t>
+            </a:r>
+          </a:p>
+        </p:txBody>
+      </p:sp>
+      <p:sp>
+        <p:nvSpPr>
+          <p:cNvPr id="27" name="Rounded Rectangle 16">
+            <a:extLst>
+              <a:ext uri="{FF2B5EF4-FFF2-40B4-BE49-F238E27FC236}">
+                <a16:creationId xmlns:a16="http://schemas.microsoft.com/office/drawing/2014/main" id="{DB4E7E40-6469-444C-A3D7-A32F553AA254}"/>
+              </a:ext>
+              <a:ext uri="{C183D7F6-B498-43B3-948B-1728B52AA6E4}">
+                <adec:decorative xmlns:adec="http://schemas.microsoft.com/office/drawing/2017/decorative" val="1"/>
+              </a:ext>
+            </a:extLst>
+          </p:cNvPr>
+          <p:cNvSpPr>
+            <a:spLocks noGrp="1" noRot="1" noChangeAspect="1" noMove="1" noResize="1" noEditPoints="1" noAdjustHandles="1" noChangeArrowheads="1" noChangeShapeType="1" noTextEdit="1"/>
+          </p:cNvSpPr>
+          <p:nvPr>
+            <p:extLst>
+              <p:ext uri="{386F3935-93C4-4BCD-93E2-E3B085C9AB24}">
+                <p16:designElem xmlns:p16="http://schemas.microsoft.com/office/powerpoint/2015/main" val="1"/>
+              </p:ext>
+            </p:extLst>
+          </p:nvPr>
+        </p:nvSpPr>
+        <p:spPr>
+          <a:xfrm>
+            <a:off x="7590503" y="648931"/>
+            <a:ext cx="3912520" cy="5231964"/>
+          </a:xfrm>
+          <a:prstGeom prst="roundRect">
+            <a:avLst>
+              <a:gd name="adj" fmla="val 4834"/>
+            </a:avLst>
+          </a:prstGeom>
+          <a:solidFill>
+            <a:schemeClr val="bg1"/>
+          </a:solidFill>
+          <a:ln w="38100">
+            <a:gradFill flip="none" rotWithShape="1">
+              <a:gsLst>
+                <a:gs pos="0">
+                  <a:schemeClr val="bg2"/>
+                </a:gs>
+                <a:gs pos="100000">
+                  <a:schemeClr val="bg2">
+                    <a:lumMod val="75000"/>
+                  </a:schemeClr>
+                </a:gs>
+              </a:gsLst>
+              <a:lin ang="5400000" scaled="0"/>
+              <a:tileRect/>
+            </a:gradFill>
+          </a:ln>
+          <a:effectLst>
+            <a:innerShdw blurRad="57150" dist="38100" dir="14460000">
+              <a:srgbClr val="000000">
+                <a:alpha val="70000"/>
+              </a:srgbClr>
+            </a:innerShdw>
+          </a:effectLst>
+        </p:spPr>
+        <p:style>
+          <a:lnRef idx="2">
+            <a:schemeClr val="accent1">
+              <a:shade val="50000"/>
+            </a:schemeClr>
+          </a:lnRef>
+          <a:fillRef idx="1">
+            <a:schemeClr val="accent1"/>
+          </a:fillRef>
+          <a:effectRef idx="0">
+            <a:schemeClr val="accent1"/>
+          </a:effectRef>
+          <a:fontRef idx="minor">
+            <a:schemeClr val="lt1"/>
+          </a:fontRef>
+        </p:style>
+        <p:txBody>
+          <a:bodyPr rtlCol="0" anchor="ctr"/>
+          <a:lstStyle/>
+          <a:p>
+            <a:pPr algn="ctr"/>
+            <a:endParaRPr lang="en-US"/>
+          </a:p>
+        </p:txBody>
+      </p:sp>
+      <p:pic>
+        <p:nvPicPr>
+          <p:cNvPr id="6" name="Content Placeholder 5" descr="A close up of a logo&#10;&#10;Description automatically generated">
+            <a:extLst>
+              <a:ext uri="{FF2B5EF4-FFF2-40B4-BE49-F238E27FC236}">
+                <a16:creationId xmlns:a16="http://schemas.microsoft.com/office/drawing/2014/main" id="{D5E3E2BE-26DE-47C4-8626-70DC71A9CD48}"/>
+              </a:ext>
+            </a:extLst>
+          </p:cNvPr>
+          <p:cNvPicPr>
+            <a:picLocks noGrp="1" noChangeAspect="1"/>
+          </p:cNvPicPr>
+          <p:nvPr>
+            <p:ph sz="half" idx="2"/>
+          </p:nvPr>
+        </p:nvPicPr>
+        <p:blipFill>
+          <a:blip r:embed="rId3">
+            <a:extLst>
+              <a:ext uri="{28A0092B-C50C-407E-A947-70E740481C1C}">
+                <a14:useLocalDpi xmlns:a14="http://schemas.microsoft.com/office/drawing/2010/main" val="0"/>
+              </a:ext>
+            </a:extLst>
+          </a:blip>
+          <a:stretch>
+            <a:fillRect/>
+          </a:stretch>
+        </p:blipFill>
+        <p:spPr>
+          <a:xfrm>
+            <a:off x="7951593" y="1403505"/>
+            <a:ext cx="3226968" cy="3763228"/>
+          </a:xfrm>
+          <a:prstGeom prst="rect">
+            <a:avLst/>
+          </a:prstGeom>
+        </p:spPr>
+      </p:pic>
+    </p:spTree>
+    <p:extLst>
+      <p:ext uri="{BB962C8B-B14F-4D97-AF65-F5344CB8AC3E}">
+        <p14:creationId xmlns:p14="http://schemas.microsoft.com/office/powerpoint/2010/main" val="3029706931"/>
+      </p:ext>
+    </p:extLst>
+  </p:cSld>
+  <p:clrMapOvr>
+    <a:masterClrMapping/>
+  </p:clrMapOvr>
+</p:sld>
+</file>
+
+<file path=ppt/slides/slide6.xml><?xml version="1.0" encoding="utf-8"?>
+<p:sld xmlns:a="http://schemas.openxmlformats.org/drawingml/2006/main" xmlns:r="http://schemas.openxmlformats.org/officeDocument/2006/relationships" xmlns:p="http://schemas.openxmlformats.org/presentationml/2006/main">
+  <p:cSld>
+    <p:bg>
+      <p:bgPr>
+        <a:blipFill rotWithShape="1">
+          <a:blip r:embed="rId2">
+            <a:duotone>
+              <a:schemeClr val="bg2">
+                <a:shade val="76000"/>
+                <a:satMod val="180000"/>
+              </a:schemeClr>
+              <a:schemeClr val="bg2">
+                <a:tint val="80000"/>
+                <a:satMod val="120000"/>
+                <a:lumMod val="180000"/>
+              </a:schemeClr>
+            </a:duotone>
+            <a:extLst/>
+          </a:blip>
+          <a:stretch/>
+        </a:blipFill>
+        <a:effectLst/>
+      </p:bgPr>
+    </p:bg>
+    <p:spTree>
+      <p:nvGrpSpPr>
+        <p:cNvPr id="1" name=""/>
+        <p:cNvGrpSpPr/>
+        <p:nvPr/>
+      </p:nvGrpSpPr>
+      <p:grpSpPr>
+        <a:xfrm>
+          <a:off x="0" y="0"/>
+          <a:ext cx="0" cy="0"/>
+          <a:chOff x="0" y="0"/>
+          <a:chExt cx="0" cy="0"/>
+        </a:xfrm>
+      </p:grpSpPr>
+      <p:grpSp>
+        <p:nvGrpSpPr>
+          <p:cNvPr id="10" name="Group 9">
+            <a:extLst>
+              <a:ext uri="{FF2B5EF4-FFF2-40B4-BE49-F238E27FC236}">
+                <a16:creationId xmlns:a16="http://schemas.microsoft.com/office/drawing/2014/main" id="{08F94D66-27EC-4CB8-8226-D7F41C161863}"/>
+              </a:ext>
+              <a:ext uri="{C183D7F6-B498-43B3-948B-1728B52AA6E4}">
+                <adec:decorative xmlns:adec="http://schemas.microsoft.com/office/drawing/2017/decorative" val="1"/>
+              </a:ext>
+            </a:extLst>
+          </p:cNvPr>
+          <p:cNvGrpSpPr>
+            <a:grpSpLocks noGrp="1" noUngrp="1" noRot="1" noChangeAspect="1" noMove="1" noResize="1"/>
+          </p:cNvGrpSpPr>
+          <p:nvPr>
+            <p:extLst>
+              <p:ext uri="{386F3935-93C4-4BCD-93E2-E3B085C9AB24}">
+                <p16:designElem xmlns:p16="http://schemas.microsoft.com/office/powerpoint/2015/main" val="1"/>
+              </p:ext>
+            </p:extLst>
+          </p:nvPr>
+        </p:nvGrpSpPr>
+        <p:grpSpPr>
+          <a:xfrm>
+            <a:off x="546100" y="-4763"/>
+            <a:ext cx="5014912" cy="6862763"/>
+            <a:chOff x="2928938" y="-4763"/>
+            <a:chExt cx="5014912" cy="6862763"/>
+          </a:xfrm>
+        </p:grpSpPr>
+        <p:sp>
+          <p:nvSpPr>
+            <p:cNvPr id="11" name="Freeform 6">
+              <a:extLst>
+                <a:ext uri="{FF2B5EF4-FFF2-40B4-BE49-F238E27FC236}">
+                  <a16:creationId xmlns:a16="http://schemas.microsoft.com/office/drawing/2014/main" id="{1A53964C-7D93-4C48-A4A6-C4C2C393C59D}"/>
+                </a:ext>
+                <a:ext uri="{C183D7F6-B498-43B3-948B-1728B52AA6E4}">
+                  <adec:decorative xmlns:adec="http://schemas.microsoft.com/office/drawing/2017/decorative" val="1"/>
+                </a:ext>
+              </a:extLst>
+            </p:cNvPr>
+            <p:cNvSpPr/>
+            <p:nvPr>
+              <p:extLst>
+                <p:ext uri="{386F3935-93C4-4BCD-93E2-E3B085C9AB24}">
+                  <p16:designElem xmlns:p16="http://schemas.microsoft.com/office/powerpoint/2015/main" val="1"/>
+                </p:ext>
+              </p:extLst>
+            </p:nvPr>
+          </p:nvSpPr>
+          <p:spPr bwMode="auto">
+            <a:xfrm>
+              <a:off x="3367088" y="-4763"/>
+              <a:ext cx="1063625" cy="2782888"/>
+            </a:xfrm>
+            <a:custGeom>
+              <a:avLst/>
+              <a:gdLst/>
+              <a:ahLst/>
+              <a:cxnLst/>
+              <a:rect l="0" t="0" r="r" b="b"/>
+              <a:pathLst>
+                <a:path w="670" h="1753">
+                  <a:moveTo>
+                    <a:pt x="0" y="1696"/>
+                  </a:moveTo>
+                  <a:lnTo>
+                    <a:pt x="225" y="1753"/>
+                  </a:lnTo>
+                  <a:lnTo>
+                    <a:pt x="670" y="0"/>
+                  </a:lnTo>
+                  <a:lnTo>
+                    <a:pt x="430" y="0"/>
+                  </a:lnTo>
+                  <a:lnTo>
+                    <a:pt x="0" y="1696"/>
+                  </a:lnTo>
+                  <a:close/>
+                </a:path>
+              </a:pathLst>
+            </a:custGeom>
+            <a:solidFill>
+              <a:schemeClr val="accent1"/>
+            </a:solidFill>
+            <a:ln>
+              <a:noFill/>
+            </a:ln>
+          </p:spPr>
+        </p:sp>
+        <p:sp>
+          <p:nvSpPr>
+            <p:cNvPr id="12" name="Freeform 7">
+              <a:extLst>
+                <a:ext uri="{FF2B5EF4-FFF2-40B4-BE49-F238E27FC236}">
+                  <a16:creationId xmlns:a16="http://schemas.microsoft.com/office/drawing/2014/main" id="{9C944EEC-539E-4389-8785-58E65D04E8DC}"/>
+                </a:ext>
+                <a:ext uri="{C183D7F6-B498-43B3-948B-1728B52AA6E4}">
+                  <adec:decorative xmlns:adec="http://schemas.microsoft.com/office/drawing/2017/decorative" val="1"/>
+                </a:ext>
+              </a:extLst>
+            </p:cNvPr>
+            <p:cNvSpPr/>
+            <p:nvPr>
+              <p:extLst>
+                <p:ext uri="{386F3935-93C4-4BCD-93E2-E3B085C9AB24}">
+                  <p16:designElem xmlns:p16="http://schemas.microsoft.com/office/powerpoint/2015/main" val="1"/>
+                </p:ext>
+              </p:extLst>
+            </p:nvPr>
+          </p:nvSpPr>
+          <p:spPr bwMode="auto">
+            <a:xfrm>
+              <a:off x="2928938" y="-4763"/>
+              <a:ext cx="1035050" cy="2673350"/>
+            </a:xfrm>
+            <a:custGeom>
+              <a:avLst/>
+              <a:gdLst/>
+              <a:ahLst/>
+              <a:cxnLst/>
+              <a:rect l="0" t="0" r="r" b="b"/>
+              <a:pathLst>
+                <a:path w="652" h="1684">
+                  <a:moveTo>
+                    <a:pt x="225" y="1684"/>
+                  </a:moveTo>
+                  <a:lnTo>
+                    <a:pt x="652" y="0"/>
+                  </a:lnTo>
+                  <a:lnTo>
+                    <a:pt x="411" y="0"/>
+                  </a:lnTo>
+                  <a:lnTo>
+                    <a:pt x="0" y="1627"/>
+                  </a:lnTo>
+                  <a:lnTo>
+                    <a:pt x="219" y="1681"/>
+                  </a:lnTo>
+                  <a:lnTo>
+                    <a:pt x="225" y="1684"/>
+                  </a:lnTo>
+                  <a:close/>
+                </a:path>
+              </a:pathLst>
+            </a:custGeom>
+            <a:solidFill>
+              <a:schemeClr val="tx1">
+                <a:lumMod val="65000"/>
+                <a:lumOff val="35000"/>
+              </a:schemeClr>
+            </a:solidFill>
+            <a:ln>
+              <a:noFill/>
+            </a:ln>
+          </p:spPr>
+        </p:sp>
+        <p:sp>
+          <p:nvSpPr>
+            <p:cNvPr id="13" name="Freeform 9">
+              <a:extLst>
+                <a:ext uri="{FF2B5EF4-FFF2-40B4-BE49-F238E27FC236}">
+                  <a16:creationId xmlns:a16="http://schemas.microsoft.com/office/drawing/2014/main" id="{7836EB7E-895C-4D68-B92E-312B371CBDBF}"/>
+                </a:ext>
+                <a:ext uri="{C183D7F6-B498-43B3-948B-1728B52AA6E4}">
+                  <adec:decorative xmlns:adec="http://schemas.microsoft.com/office/drawing/2017/decorative" val="1"/>
+                </a:ext>
+              </a:extLst>
+            </p:cNvPr>
+            <p:cNvSpPr/>
+            <p:nvPr>
+              <p:extLst>
+                <p:ext uri="{386F3935-93C4-4BCD-93E2-E3B085C9AB24}">
+                  <p16:designElem xmlns:p16="http://schemas.microsoft.com/office/powerpoint/2015/main" val="1"/>
+                </p:ext>
+              </p:extLst>
+            </p:nvPr>
+          </p:nvSpPr>
+          <p:spPr bwMode="auto">
+            <a:xfrm>
+              <a:off x="2928938" y="2582862"/>
+              <a:ext cx="2693987" cy="4275138"/>
+            </a:xfrm>
+            <a:custGeom>
+              <a:avLst/>
+              <a:gdLst/>
+              <a:ahLst/>
+              <a:cxnLst/>
+              <a:rect l="0" t="0" r="r" b="b"/>
+              <a:pathLst>
+                <a:path w="1697" h="2693">
+                  <a:moveTo>
+                    <a:pt x="0" y="0"/>
+                  </a:moveTo>
+                  <a:lnTo>
+                    <a:pt x="1622" y="2693"/>
+                  </a:lnTo>
+                  <a:lnTo>
+                    <a:pt x="1697" y="2693"/>
+                  </a:lnTo>
+                  <a:lnTo>
+                    <a:pt x="0" y="0"/>
+                  </a:lnTo>
+                  <a:close/>
+                </a:path>
+              </a:pathLst>
+            </a:custGeom>
+            <a:solidFill>
+              <a:schemeClr val="tx1">
+                <a:lumMod val="85000"/>
+                <a:lumOff val="15000"/>
+              </a:schemeClr>
+            </a:solidFill>
+            <a:ln>
+              <a:noFill/>
+            </a:ln>
+          </p:spPr>
+        </p:sp>
+        <p:sp>
+          <p:nvSpPr>
+            <p:cNvPr id="14" name="Freeform 10">
+              <a:extLst>
+                <a:ext uri="{FF2B5EF4-FFF2-40B4-BE49-F238E27FC236}">
+                  <a16:creationId xmlns:a16="http://schemas.microsoft.com/office/drawing/2014/main" id="{0F29242B-8CE7-4636-B326-4BEE42EB6D6F}"/>
+                </a:ext>
+                <a:ext uri="{C183D7F6-B498-43B3-948B-1728B52AA6E4}">
+                  <adec:decorative xmlns:adec="http://schemas.microsoft.com/office/drawing/2017/decorative" val="1"/>
+                </a:ext>
+              </a:extLst>
+            </p:cNvPr>
+            <p:cNvSpPr/>
+            <p:nvPr>
+              <p:extLst>
+                <p:ext uri="{386F3935-93C4-4BCD-93E2-E3B085C9AB24}">
+                  <p16:designElem xmlns:p16="http://schemas.microsoft.com/office/powerpoint/2015/main" val="1"/>
+                </p:ext>
+              </p:extLst>
+            </p:nvPr>
+          </p:nvSpPr>
+          <p:spPr bwMode="auto">
+            <a:xfrm>
+              <a:off x="3371850" y="2692400"/>
+              <a:ext cx="3332162" cy="4165600"/>
+            </a:xfrm>
+            <a:custGeom>
+              <a:avLst/>
+              <a:gdLst/>
+              <a:ahLst/>
+              <a:cxnLst/>
+              <a:rect l="0" t="0" r="r" b="b"/>
+              <a:pathLst>
+                <a:path w="2099" h="2624">
+                  <a:moveTo>
+                    <a:pt x="2099" y="2624"/>
+                  </a:moveTo>
+                  <a:lnTo>
+                    <a:pt x="0" y="0"/>
+                  </a:lnTo>
+                  <a:lnTo>
+                    <a:pt x="2021" y="2624"/>
+                  </a:lnTo>
+                  <a:lnTo>
+                    <a:pt x="2099" y="2624"/>
+                  </a:lnTo>
+                  <a:close/>
+                </a:path>
+              </a:pathLst>
+            </a:custGeom>
+            <a:solidFill>
+              <a:schemeClr val="accent1">
+                <a:lumMod val="50000"/>
+              </a:schemeClr>
+            </a:solidFill>
+            <a:ln>
+              <a:noFill/>
+            </a:ln>
+          </p:spPr>
+        </p:sp>
+        <p:sp>
+          <p:nvSpPr>
+            <p:cNvPr id="15" name="Freeform 11">
+              <a:extLst>
+                <a:ext uri="{FF2B5EF4-FFF2-40B4-BE49-F238E27FC236}">
+                  <a16:creationId xmlns:a16="http://schemas.microsoft.com/office/drawing/2014/main" id="{4D0B8E9A-7727-4AD9-974E-8815F0B20EB4}"/>
+                </a:ext>
+                <a:ext uri="{C183D7F6-B498-43B3-948B-1728B52AA6E4}">
+                  <adec:decorative xmlns:adec="http://schemas.microsoft.com/office/drawing/2017/decorative" val="1"/>
+                </a:ext>
+              </a:extLst>
+            </p:cNvPr>
+            <p:cNvSpPr/>
+            <p:nvPr>
+              <p:extLst>
+                <p:ext uri="{386F3935-93C4-4BCD-93E2-E3B085C9AB24}">
+                  <p16:designElem xmlns:p16="http://schemas.microsoft.com/office/powerpoint/2015/main" val="1"/>
+                </p:ext>
+              </p:extLst>
+            </p:nvPr>
+          </p:nvSpPr>
+          <p:spPr bwMode="auto">
+            <a:xfrm>
+              <a:off x="3367088" y="2687637"/>
+              <a:ext cx="4576762" cy="4170363"/>
+            </a:xfrm>
+            <a:custGeom>
+              <a:avLst/>
+              <a:gdLst/>
+              <a:ahLst/>
+              <a:cxnLst/>
+              <a:rect l="0" t="0" r="r" b="b"/>
+              <a:pathLst>
+                <a:path w="2883" h="2627">
+                  <a:moveTo>
+                    <a:pt x="0" y="0"/>
+                  </a:moveTo>
+                  <a:lnTo>
+                    <a:pt x="3" y="3"/>
+                  </a:lnTo>
+                  <a:lnTo>
+                    <a:pt x="2102" y="2627"/>
+                  </a:lnTo>
+                  <a:lnTo>
+                    <a:pt x="2883" y="2627"/>
+                  </a:lnTo>
+                  <a:lnTo>
+                    <a:pt x="225" y="57"/>
+                  </a:lnTo>
+                  <a:lnTo>
+                    <a:pt x="0" y="0"/>
+                  </a:lnTo>
+                  <a:close/>
+                </a:path>
+              </a:pathLst>
+            </a:custGeom>
+            <a:solidFill>
+              <a:schemeClr val="accent1">
+                <a:lumMod val="75000"/>
+              </a:schemeClr>
+            </a:solidFill>
+            <a:ln>
+              <a:noFill/>
+            </a:ln>
+          </p:spPr>
+        </p:sp>
+        <p:sp>
+          <p:nvSpPr>
+            <p:cNvPr id="16" name="Freeform 12">
+              <a:extLst>
+                <a:ext uri="{FF2B5EF4-FFF2-40B4-BE49-F238E27FC236}">
+                  <a16:creationId xmlns:a16="http://schemas.microsoft.com/office/drawing/2014/main" id="{1CD6C65C-71BE-4549-926A-1C1135FD06DF}"/>
+                </a:ext>
+                <a:ext uri="{C183D7F6-B498-43B3-948B-1728B52AA6E4}">
+                  <adec:decorative xmlns:adec="http://schemas.microsoft.com/office/drawing/2017/decorative" val="1"/>
+                </a:ext>
+              </a:extLst>
+            </p:cNvPr>
+            <p:cNvSpPr/>
+            <p:nvPr>
+              <p:extLst>
+                <p:ext uri="{386F3935-93C4-4BCD-93E2-E3B085C9AB24}">
+                  <p16:designElem xmlns:p16="http://schemas.microsoft.com/office/powerpoint/2015/main" val="1"/>
+                </p:ext>
+              </p:extLst>
+            </p:nvPr>
+          </p:nvSpPr>
+          <p:spPr bwMode="auto">
+            <a:xfrm>
+              <a:off x="2928938" y="2578100"/>
+              <a:ext cx="3584575" cy="4279900"/>
+            </a:xfrm>
+            <a:custGeom>
+              <a:avLst/>
+              <a:gdLst/>
+              <a:ahLst/>
+              <a:cxnLst/>
+              <a:rect l="0" t="0" r="r" b="b"/>
+              <a:pathLst>
+                <a:path w="2258" h="2696">
+                  <a:moveTo>
+                    <a:pt x="2258" y="2696"/>
+                  </a:moveTo>
+                  <a:lnTo>
+                    <a:pt x="264" y="111"/>
+                  </a:lnTo>
+                  <a:lnTo>
+                    <a:pt x="228" y="60"/>
+                  </a:lnTo>
+                  <a:lnTo>
+                    <a:pt x="225" y="57"/>
+                  </a:lnTo>
+                  <a:lnTo>
+                    <a:pt x="0" y="0"/>
+                  </a:lnTo>
+                  <a:lnTo>
+                    <a:pt x="0" y="3"/>
+                  </a:lnTo>
+                  <a:lnTo>
+                    <a:pt x="1697" y="2696"/>
+                  </a:lnTo>
+                  <a:lnTo>
+                    <a:pt x="2258" y="2696"/>
+                  </a:lnTo>
+                  <a:close/>
+                </a:path>
+              </a:pathLst>
+            </a:custGeom>
+            <a:solidFill>
+              <a:schemeClr val="tx1">
+                <a:lumMod val="75000"/>
+                <a:lumOff val="25000"/>
+              </a:schemeClr>
+            </a:solidFill>
+            <a:ln>
+              <a:noFill/>
+            </a:ln>
+          </p:spPr>
+        </p:sp>
+      </p:grpSp>
+      <p:sp>
+        <p:nvSpPr>
+          <p:cNvPr id="2" name="Title 1">
+            <a:extLst>
+              <a:ext uri="{FF2B5EF4-FFF2-40B4-BE49-F238E27FC236}">
+                <a16:creationId xmlns:a16="http://schemas.microsoft.com/office/drawing/2014/main" id="{4316ECA8-CFCD-4398-8370-211FD988D9FA}"/>
+              </a:ext>
+            </a:extLst>
+          </p:cNvPr>
+          <p:cNvSpPr>
+            <a:spLocks noGrp="1"/>
+          </p:cNvSpPr>
+          <p:nvPr>
+            <p:ph type="title"/>
+          </p:nvPr>
+        </p:nvSpPr>
+        <p:spPr>
+          <a:xfrm>
+            <a:off x="2253785" y="1380068"/>
+            <a:ext cx="5428432" cy="2616199"/>
+          </a:xfrm>
+        </p:spPr>
+        <p:txBody>
+          <a:bodyPr vert="horz" lIns="91440" tIns="45720" rIns="91440" bIns="45720" rtlCol="0" anchor="b">
+            <a:normAutofit/>
+          </a:bodyPr>
+          <a:lstStyle/>
+          <a:p>
+            <a:pPr algn="r">
+              <a:lnSpc>
+                <a:spcPct val="90000"/>
+              </a:lnSpc>
+            </a:pPr>
+            <a:r>
+              <a:rPr lang="en-US" sz="6000" dirty="0"/>
+              <a:t>Ability to create a Business card </a:t>
+            </a:r>
+            <a:br>
+              <a:rPr lang="en-US" sz="6000" dirty="0"/>
+            </a:br>
+            <a:endParaRPr lang="en-US" sz="6000" dirty="0"/>
+          </a:p>
+        </p:txBody>
+      </p:sp>
+      <p:pic>
+        <p:nvPicPr>
+          <p:cNvPr id="9" name="Content Placeholder 8" descr="A screenshot of a cell phone&#10;&#10;Description automatically generated">
+            <a:extLst>
+              <a:ext uri="{FF2B5EF4-FFF2-40B4-BE49-F238E27FC236}">
+                <a16:creationId xmlns:a16="http://schemas.microsoft.com/office/drawing/2014/main" id="{D9121830-57B0-47B9-BE24-68F996DDDD2B}"/>
+              </a:ext>
+            </a:extLst>
+          </p:cNvPr>
+          <p:cNvPicPr>
+            <a:picLocks noGrp="1" noChangeAspect="1"/>
+          </p:cNvPicPr>
+          <p:nvPr>
+            <p:ph idx="1"/>
+          </p:nvPr>
+        </p:nvPicPr>
+        <p:blipFill>
+          <a:blip r:embed="rId3">
+            <a:extLst>
+              <a:ext uri="{28A0092B-C50C-407E-A947-70E740481C1C}">
+                <a14:useLocalDpi xmlns:a14="http://schemas.microsoft.com/office/drawing/2010/main" val="0"/>
+              </a:ext>
+            </a:extLst>
+          </a:blip>
+          <a:stretch>
+            <a:fillRect/>
+          </a:stretch>
+        </p:blipFill>
+        <p:spPr>
+          <a:xfrm>
+            <a:off x="8315325" y="-4763"/>
+            <a:ext cx="3876675" cy="6891868"/>
+          </a:xfrm>
+        </p:spPr>
+      </p:pic>
+    </p:spTree>
+    <p:extLst>
+      <p:ext uri="{BB962C8B-B14F-4D97-AF65-F5344CB8AC3E}">
+        <p14:creationId xmlns:p14="http://schemas.microsoft.com/office/powerpoint/2010/main" val="3529159275"/>
+      </p:ext>
+    </p:extLst>
+  </p:cSld>
+  <p:clrMapOvr>
+    <a:masterClrMapping/>
+  </p:clrMapOvr>
+</p:sld>
+</file>
+
+<file path=ppt/slides/slide7.xml><?xml version="1.0" encoding="utf-8"?>
+<p:sld xmlns:a="http://schemas.openxmlformats.org/drawingml/2006/main" xmlns:r="http://schemas.openxmlformats.org/officeDocument/2006/relationships" xmlns:p="http://schemas.openxmlformats.org/presentationml/2006/main">
+  <p:cSld>
+    <p:bg>
+      <p:bgPr>
+        <a:blipFill rotWithShape="1">
+          <a:blip r:embed="rId2">
+            <a:duotone>
+              <a:schemeClr val="bg2">
+                <a:shade val="76000"/>
+                <a:satMod val="180000"/>
+              </a:schemeClr>
+              <a:schemeClr val="bg2">
+                <a:tint val="80000"/>
+                <a:satMod val="120000"/>
+                <a:lumMod val="180000"/>
+              </a:schemeClr>
+            </a:duotone>
+            <a:extLst/>
+          </a:blip>
+          <a:stretch/>
+        </a:blipFill>
+        <a:effectLst/>
+      </p:bgPr>
+    </p:bg>
+    <p:spTree>
+      <p:nvGrpSpPr>
+        <p:cNvPr id="1" name=""/>
+        <p:cNvGrpSpPr/>
+        <p:nvPr/>
+      </p:nvGrpSpPr>
+      <p:grpSpPr>
+        <a:xfrm>
+          <a:off x="0" y="0"/>
+          <a:ext cx="0" cy="0"/>
+          <a:chOff x="0" y="0"/>
+          <a:chExt cx="0" cy="0"/>
+        </a:xfrm>
+      </p:grpSpPr>
+      <p:grpSp>
+        <p:nvGrpSpPr>
+          <p:cNvPr id="10" name="Group 9">
+            <a:extLst>
+              <a:ext uri="{FF2B5EF4-FFF2-40B4-BE49-F238E27FC236}">
+                <a16:creationId xmlns:a16="http://schemas.microsoft.com/office/drawing/2014/main" id="{08F94D66-27EC-4CB8-8226-D7F41C161863}"/>
+              </a:ext>
+              <a:ext uri="{C183D7F6-B498-43B3-948B-1728B52AA6E4}">
+                <adec:decorative xmlns:adec="http://schemas.microsoft.com/office/drawing/2017/decorative" val="1"/>
+              </a:ext>
+            </a:extLst>
+          </p:cNvPr>
+          <p:cNvGrpSpPr>
+            <a:grpSpLocks noGrp="1" noUngrp="1" noRot="1" noChangeAspect="1" noMove="1" noResize="1"/>
+          </p:cNvGrpSpPr>
+          <p:nvPr>
+            <p:extLst>
+              <p:ext uri="{386F3935-93C4-4BCD-93E2-E3B085C9AB24}">
+                <p16:designElem xmlns:p16="http://schemas.microsoft.com/office/powerpoint/2015/main" val="1"/>
+              </p:ext>
+            </p:extLst>
+          </p:nvPr>
+        </p:nvGrpSpPr>
+        <p:grpSpPr>
+          <a:xfrm>
+            <a:off x="546100" y="-4763"/>
+            <a:ext cx="5014912" cy="6862763"/>
+            <a:chOff x="2928938" y="-4763"/>
+            <a:chExt cx="5014912" cy="6862763"/>
+          </a:xfrm>
+        </p:grpSpPr>
+        <p:sp>
+          <p:nvSpPr>
+            <p:cNvPr id="11" name="Freeform 6">
+              <a:extLst>
+                <a:ext uri="{FF2B5EF4-FFF2-40B4-BE49-F238E27FC236}">
+                  <a16:creationId xmlns:a16="http://schemas.microsoft.com/office/drawing/2014/main" id="{1A53964C-7D93-4C48-A4A6-C4C2C393C59D}"/>
+                </a:ext>
+                <a:ext uri="{C183D7F6-B498-43B3-948B-1728B52AA6E4}">
+                  <adec:decorative xmlns:adec="http://schemas.microsoft.com/office/drawing/2017/decorative" val="1"/>
+                </a:ext>
+              </a:extLst>
+            </p:cNvPr>
+            <p:cNvSpPr/>
+            <p:nvPr>
+              <p:extLst>
+                <p:ext uri="{386F3935-93C4-4BCD-93E2-E3B085C9AB24}">
+                  <p16:designElem xmlns:p16="http://schemas.microsoft.com/office/powerpoint/2015/main" val="1"/>
+                </p:ext>
+              </p:extLst>
+            </p:nvPr>
+          </p:nvSpPr>
+          <p:spPr bwMode="auto">
+            <a:xfrm>
+              <a:off x="3367088" y="-4763"/>
+              <a:ext cx="1063625" cy="2782888"/>
+            </a:xfrm>
+            <a:custGeom>
+              <a:avLst/>
+              <a:gdLst/>
+              <a:ahLst/>
+              <a:cxnLst/>
+              <a:rect l="0" t="0" r="r" b="b"/>
+              <a:pathLst>
+                <a:path w="670" h="1753">
+                  <a:moveTo>
+                    <a:pt x="0" y="1696"/>
+                  </a:moveTo>
+                  <a:lnTo>
+                    <a:pt x="225" y="1753"/>
+                  </a:lnTo>
+                  <a:lnTo>
+                    <a:pt x="670" y="0"/>
+                  </a:lnTo>
+                  <a:lnTo>
+                    <a:pt x="430" y="0"/>
+                  </a:lnTo>
+                  <a:lnTo>
+                    <a:pt x="0" y="1696"/>
+                  </a:lnTo>
+                  <a:close/>
+                </a:path>
+              </a:pathLst>
+            </a:custGeom>
+            <a:solidFill>
+              <a:schemeClr val="accent1"/>
+            </a:solidFill>
+            <a:ln>
+              <a:noFill/>
+            </a:ln>
+          </p:spPr>
+        </p:sp>
+        <p:sp>
+          <p:nvSpPr>
+            <p:cNvPr id="12" name="Freeform 7">
+              <a:extLst>
+                <a:ext uri="{FF2B5EF4-FFF2-40B4-BE49-F238E27FC236}">
+                  <a16:creationId xmlns:a16="http://schemas.microsoft.com/office/drawing/2014/main" id="{9C944EEC-539E-4389-8785-58E65D04E8DC}"/>
+                </a:ext>
+                <a:ext uri="{C183D7F6-B498-43B3-948B-1728B52AA6E4}">
+                  <adec:decorative xmlns:adec="http://schemas.microsoft.com/office/drawing/2017/decorative" val="1"/>
+                </a:ext>
+              </a:extLst>
+            </p:cNvPr>
+            <p:cNvSpPr/>
+            <p:nvPr>
+              <p:extLst>
+                <p:ext uri="{386F3935-93C4-4BCD-93E2-E3B085C9AB24}">
+                  <p16:designElem xmlns:p16="http://schemas.microsoft.com/office/powerpoint/2015/main" val="1"/>
+                </p:ext>
+              </p:extLst>
+            </p:nvPr>
+          </p:nvSpPr>
+          <p:spPr bwMode="auto">
+            <a:xfrm>
+              <a:off x="2928938" y="-4763"/>
+              <a:ext cx="1035050" cy="2673350"/>
+            </a:xfrm>
+            <a:custGeom>
+              <a:avLst/>
+              <a:gdLst/>
+              <a:ahLst/>
+              <a:cxnLst/>
+              <a:rect l="0" t="0" r="r" b="b"/>
+              <a:pathLst>
+                <a:path w="652" h="1684">
+                  <a:moveTo>
+                    <a:pt x="225" y="1684"/>
+                  </a:moveTo>
+                  <a:lnTo>
+                    <a:pt x="652" y="0"/>
+                  </a:lnTo>
+                  <a:lnTo>
+                    <a:pt x="411" y="0"/>
+                  </a:lnTo>
+                  <a:lnTo>
+                    <a:pt x="0" y="1627"/>
+                  </a:lnTo>
+                  <a:lnTo>
+                    <a:pt x="219" y="1681"/>
+                  </a:lnTo>
+                  <a:lnTo>
+                    <a:pt x="225" y="1684"/>
+                  </a:lnTo>
+                  <a:close/>
+                </a:path>
+              </a:pathLst>
+            </a:custGeom>
+            <a:solidFill>
+              <a:schemeClr val="tx1">
+                <a:lumMod val="65000"/>
+                <a:lumOff val="35000"/>
+              </a:schemeClr>
+            </a:solidFill>
+            <a:ln>
+              <a:noFill/>
+            </a:ln>
+          </p:spPr>
+        </p:sp>
+        <p:sp>
+          <p:nvSpPr>
+            <p:cNvPr id="13" name="Freeform 9">
+              <a:extLst>
+                <a:ext uri="{FF2B5EF4-FFF2-40B4-BE49-F238E27FC236}">
+                  <a16:creationId xmlns:a16="http://schemas.microsoft.com/office/drawing/2014/main" id="{7836EB7E-895C-4D68-B92E-312B371CBDBF}"/>
+                </a:ext>
+                <a:ext uri="{C183D7F6-B498-43B3-948B-1728B52AA6E4}">
+                  <adec:decorative xmlns:adec="http://schemas.microsoft.com/office/drawing/2017/decorative" val="1"/>
+                </a:ext>
+              </a:extLst>
+            </p:cNvPr>
+            <p:cNvSpPr/>
+            <p:nvPr>
+              <p:extLst>
+                <p:ext uri="{386F3935-93C4-4BCD-93E2-E3B085C9AB24}">
+                  <p16:designElem xmlns:p16="http://schemas.microsoft.com/office/powerpoint/2015/main" val="1"/>
+                </p:ext>
+              </p:extLst>
+            </p:nvPr>
+          </p:nvSpPr>
+          <p:spPr bwMode="auto">
+            <a:xfrm>
+              <a:off x="2928938" y="2582862"/>
+              <a:ext cx="2693987" cy="4275138"/>
+            </a:xfrm>
+            <a:custGeom>
+              <a:avLst/>
+              <a:gdLst/>
+              <a:ahLst/>
+              <a:cxnLst/>
+              <a:rect l="0" t="0" r="r" b="b"/>
+              <a:pathLst>
+                <a:path w="1697" h="2693">
+                  <a:moveTo>
+                    <a:pt x="0" y="0"/>
+                  </a:moveTo>
+                  <a:lnTo>
+                    <a:pt x="1622" y="2693"/>
+                  </a:lnTo>
+                  <a:lnTo>
+                    <a:pt x="1697" y="2693"/>
+                  </a:lnTo>
+                  <a:lnTo>
+                    <a:pt x="0" y="0"/>
+                  </a:lnTo>
+                  <a:close/>
+                </a:path>
+              </a:pathLst>
+            </a:custGeom>
+            <a:solidFill>
+              <a:schemeClr val="tx1">
+                <a:lumMod val="85000"/>
+                <a:lumOff val="15000"/>
+              </a:schemeClr>
+            </a:solidFill>
+            <a:ln>
+              <a:noFill/>
+            </a:ln>
+          </p:spPr>
+        </p:sp>
+        <p:sp>
+          <p:nvSpPr>
+            <p:cNvPr id="14" name="Freeform 10">
+              <a:extLst>
+                <a:ext uri="{FF2B5EF4-FFF2-40B4-BE49-F238E27FC236}">
+                  <a16:creationId xmlns:a16="http://schemas.microsoft.com/office/drawing/2014/main" id="{0F29242B-8CE7-4636-B326-4BEE42EB6D6F}"/>
+                </a:ext>
+                <a:ext uri="{C183D7F6-B498-43B3-948B-1728B52AA6E4}">
+                  <adec:decorative xmlns:adec="http://schemas.microsoft.com/office/drawing/2017/decorative" val="1"/>
+                </a:ext>
+              </a:extLst>
+            </p:cNvPr>
+            <p:cNvSpPr/>
+            <p:nvPr>
+              <p:extLst>
+                <p:ext uri="{386F3935-93C4-4BCD-93E2-E3B085C9AB24}">
+                  <p16:designElem xmlns:p16="http://schemas.microsoft.com/office/powerpoint/2015/main" val="1"/>
+                </p:ext>
+              </p:extLst>
+            </p:nvPr>
+          </p:nvSpPr>
+          <p:spPr bwMode="auto">
+            <a:xfrm>
+              <a:off x="3371850" y="2692400"/>
+              <a:ext cx="3332162" cy="4165600"/>
+            </a:xfrm>
+            <a:custGeom>
+              <a:avLst/>
+              <a:gdLst/>
+              <a:ahLst/>
+              <a:cxnLst/>
+              <a:rect l="0" t="0" r="r" b="b"/>
+              <a:pathLst>
+                <a:path w="2099" h="2624">
+                  <a:moveTo>
+                    <a:pt x="2099" y="2624"/>
+                  </a:moveTo>
+                  <a:lnTo>
+                    <a:pt x="0" y="0"/>
+                  </a:lnTo>
+                  <a:lnTo>
+                    <a:pt x="2021" y="2624"/>
+                  </a:lnTo>
+                  <a:lnTo>
+                    <a:pt x="2099" y="2624"/>
+                  </a:lnTo>
+                  <a:close/>
+                </a:path>
+              </a:pathLst>
+            </a:custGeom>
+            <a:solidFill>
+              <a:schemeClr val="accent1">
+                <a:lumMod val="50000"/>
+              </a:schemeClr>
+            </a:solidFill>
+            <a:ln>
+              <a:noFill/>
+            </a:ln>
+          </p:spPr>
+        </p:sp>
+        <p:sp>
+          <p:nvSpPr>
+            <p:cNvPr id="15" name="Freeform 11">
+              <a:extLst>
+                <a:ext uri="{FF2B5EF4-FFF2-40B4-BE49-F238E27FC236}">
+                  <a16:creationId xmlns:a16="http://schemas.microsoft.com/office/drawing/2014/main" id="{4D0B8E9A-7727-4AD9-974E-8815F0B20EB4}"/>
+                </a:ext>
+                <a:ext uri="{C183D7F6-B498-43B3-948B-1728B52AA6E4}">
+                  <adec:decorative xmlns:adec="http://schemas.microsoft.com/office/drawing/2017/decorative" val="1"/>
+                </a:ext>
+              </a:extLst>
+            </p:cNvPr>
+            <p:cNvSpPr/>
+            <p:nvPr>
+              <p:extLst>
+                <p:ext uri="{386F3935-93C4-4BCD-93E2-E3B085C9AB24}">
+                  <p16:designElem xmlns:p16="http://schemas.microsoft.com/office/powerpoint/2015/main" val="1"/>
+                </p:ext>
+              </p:extLst>
+            </p:nvPr>
+          </p:nvSpPr>
+          <p:spPr bwMode="auto">
+            <a:xfrm>
+              <a:off x="3367088" y="2687637"/>
+              <a:ext cx="4576762" cy="4170363"/>
+            </a:xfrm>
+            <a:custGeom>
+              <a:avLst/>
+              <a:gdLst/>
+              <a:ahLst/>
+              <a:cxnLst/>
+              <a:rect l="0" t="0" r="r" b="b"/>
+              <a:pathLst>
+                <a:path w="2883" h="2627">
+                  <a:moveTo>
+                    <a:pt x="0" y="0"/>
+                  </a:moveTo>
+                  <a:lnTo>
+                    <a:pt x="3" y="3"/>
+                  </a:lnTo>
+                  <a:lnTo>
+                    <a:pt x="2102" y="2627"/>
+                  </a:lnTo>
+                  <a:lnTo>
+                    <a:pt x="2883" y="2627"/>
+                  </a:lnTo>
+                  <a:lnTo>
+                    <a:pt x="225" y="57"/>
+                  </a:lnTo>
+                  <a:lnTo>
+                    <a:pt x="0" y="0"/>
+                  </a:lnTo>
+                  <a:close/>
+                </a:path>
+              </a:pathLst>
+            </a:custGeom>
+            <a:solidFill>
+              <a:schemeClr val="accent1">
+                <a:lumMod val="75000"/>
+              </a:schemeClr>
+            </a:solidFill>
+            <a:ln>
+              <a:noFill/>
+            </a:ln>
+          </p:spPr>
+        </p:sp>
+        <p:sp>
+          <p:nvSpPr>
+            <p:cNvPr id="16" name="Freeform 12">
+              <a:extLst>
+                <a:ext uri="{FF2B5EF4-FFF2-40B4-BE49-F238E27FC236}">
+                  <a16:creationId xmlns:a16="http://schemas.microsoft.com/office/drawing/2014/main" id="{1CD6C65C-71BE-4549-926A-1C1135FD06DF}"/>
+                </a:ext>
+                <a:ext uri="{C183D7F6-B498-43B3-948B-1728B52AA6E4}">
+                  <adec:decorative xmlns:adec="http://schemas.microsoft.com/office/drawing/2017/decorative" val="1"/>
+                </a:ext>
+              </a:extLst>
+            </p:cNvPr>
+            <p:cNvSpPr/>
+            <p:nvPr>
+              <p:extLst>
+                <p:ext uri="{386F3935-93C4-4BCD-93E2-E3B085C9AB24}">
+                  <p16:designElem xmlns:p16="http://schemas.microsoft.com/office/powerpoint/2015/main" val="1"/>
+                </p:ext>
+              </p:extLst>
+            </p:nvPr>
+          </p:nvSpPr>
+          <p:spPr bwMode="auto">
+            <a:xfrm>
+              <a:off x="2928938" y="2578100"/>
+              <a:ext cx="3584575" cy="4279900"/>
+            </a:xfrm>
+            <a:custGeom>
+              <a:avLst/>
+              <a:gdLst/>
+              <a:ahLst/>
+              <a:cxnLst/>
+              <a:rect l="0" t="0" r="r" b="b"/>
+              <a:pathLst>
+                <a:path w="2258" h="2696">
+                  <a:moveTo>
+                    <a:pt x="2258" y="2696"/>
+                  </a:moveTo>
+                  <a:lnTo>
+                    <a:pt x="264" y="111"/>
+                  </a:lnTo>
+                  <a:lnTo>
+                    <a:pt x="228" y="60"/>
+                  </a:lnTo>
+                  <a:lnTo>
+                    <a:pt x="225" y="57"/>
+                  </a:lnTo>
+                  <a:lnTo>
+                    <a:pt x="0" y="0"/>
+                  </a:lnTo>
+                  <a:lnTo>
+                    <a:pt x="0" y="3"/>
+                  </a:lnTo>
+                  <a:lnTo>
+                    <a:pt x="1697" y="2696"/>
+                  </a:lnTo>
+                  <a:lnTo>
+                    <a:pt x="2258" y="2696"/>
+                  </a:lnTo>
+                  <a:close/>
+                </a:path>
+              </a:pathLst>
+            </a:custGeom>
+            <a:solidFill>
+              <a:schemeClr val="tx1">
+                <a:lumMod val="75000"/>
+                <a:lumOff val="25000"/>
+              </a:schemeClr>
+            </a:solidFill>
+            <a:ln>
+              <a:noFill/>
+            </a:ln>
+          </p:spPr>
+        </p:sp>
+      </p:grpSp>
+      <p:sp>
+        <p:nvSpPr>
+          <p:cNvPr id="2" name="Title 1">
+            <a:extLst>
+              <a:ext uri="{FF2B5EF4-FFF2-40B4-BE49-F238E27FC236}">
+                <a16:creationId xmlns:a16="http://schemas.microsoft.com/office/drawing/2014/main" id="{4316ECA8-CFCD-4398-8370-211FD988D9FA}"/>
+              </a:ext>
+            </a:extLst>
+          </p:cNvPr>
+          <p:cNvSpPr>
+            <a:spLocks noGrp="1"/>
+          </p:cNvSpPr>
+          <p:nvPr>
+            <p:ph type="title"/>
+          </p:nvPr>
+        </p:nvSpPr>
+        <p:spPr>
+          <a:xfrm>
+            <a:off x="1581150" y="2245949"/>
+            <a:ext cx="5743837" cy="3005501"/>
+          </a:xfrm>
+        </p:spPr>
+        <p:txBody>
+          <a:bodyPr vert="horz" lIns="91440" tIns="45720" rIns="91440" bIns="45720" rtlCol="0" anchor="b">
+            <a:normAutofit fontScale="90000"/>
+          </a:bodyPr>
+          <a:lstStyle/>
+          <a:p>
+            <a:pPr algn="r">
+              <a:lnSpc>
+                <a:spcPct val="90000"/>
+              </a:lnSpc>
+            </a:pPr>
+            <a:r>
+              <a:rPr lang="en-US" sz="6000" dirty="0"/>
+              <a:t>Ability to share a Business Card between phones</a:t>
+            </a:r>
+            <a:br>
+              <a:rPr lang="en-US" sz="6000" dirty="0"/>
+            </a:br>
+            <a:br>
+              <a:rPr lang="en-US" sz="6000" dirty="0"/>
+            </a:br>
+            <a:endParaRPr lang="en-US" sz="6000" dirty="0"/>
+          </a:p>
+        </p:txBody>
+      </p:sp>
+      <p:pic>
+        <p:nvPicPr>
+          <p:cNvPr id="6" name="Content Placeholder 5" descr="A screenshot of a cell phone&#10;&#10;Description automatically generated">
+            <a:extLst>
+              <a:ext uri="{FF2B5EF4-FFF2-40B4-BE49-F238E27FC236}">
+                <a16:creationId xmlns:a16="http://schemas.microsoft.com/office/drawing/2014/main" id="{9915739D-98D4-4822-8928-F7B9120BF610}"/>
+              </a:ext>
+            </a:extLst>
+          </p:cNvPr>
+          <p:cNvPicPr>
+            <a:picLocks noGrp="1" noChangeAspect="1"/>
+          </p:cNvPicPr>
+          <p:nvPr>
+            <p:ph idx="1"/>
+          </p:nvPr>
+        </p:nvPicPr>
+        <p:blipFill>
+          <a:blip r:embed="rId3">
+            <a:extLst>
+              <a:ext uri="{28A0092B-C50C-407E-A947-70E740481C1C}">
+                <a14:useLocalDpi xmlns:a14="http://schemas.microsoft.com/office/drawing/2010/main" val="0"/>
+              </a:ext>
+            </a:extLst>
+          </a:blip>
+          <a:stretch>
+            <a:fillRect/>
+          </a:stretch>
+        </p:blipFill>
+        <p:spPr>
+          <a:xfrm>
+            <a:off x="8315325" y="-4764"/>
+            <a:ext cx="3876675" cy="6891869"/>
+          </a:xfrm>
+        </p:spPr>
+      </p:pic>
+    </p:spTree>
+    <p:extLst>
+      <p:ext uri="{BB962C8B-B14F-4D97-AF65-F5344CB8AC3E}">
+        <p14:creationId xmlns:p14="http://schemas.microsoft.com/office/powerpoint/2010/main" val="702146362"/>
+      </p:ext>
+    </p:extLst>
+  </p:cSld>
+  <p:clrMapOvr>
+    <a:masterClrMapping/>
+  </p:clrMapOvr>
+</p:sld>
+</file>
+
+<file path=ppt/slides/slide8.xml><?xml version="1.0" encoding="utf-8"?>
+<p:sld xmlns:a="http://schemas.openxmlformats.org/drawingml/2006/main" xmlns:r="http://schemas.openxmlformats.org/officeDocument/2006/relationships" xmlns:p="http://schemas.openxmlformats.org/presentationml/2006/main">
+  <p:cSld>
+    <p:bg>
+      <p:bgPr>
+        <a:blipFill rotWithShape="1">
+          <a:blip r:embed="rId2">
+            <a:duotone>
+              <a:schemeClr val="bg2">
+                <a:shade val="76000"/>
+                <a:satMod val="180000"/>
+              </a:schemeClr>
+              <a:schemeClr val="bg2">
+                <a:tint val="80000"/>
+                <a:satMod val="120000"/>
+                <a:lumMod val="180000"/>
+              </a:schemeClr>
+            </a:duotone>
+            <a:extLst/>
+          </a:blip>
+          <a:stretch/>
+        </a:blipFill>
+        <a:effectLst/>
+      </p:bgPr>
+    </p:bg>
+    <p:spTree>
+      <p:nvGrpSpPr>
+        <p:cNvPr id="1" name=""/>
+        <p:cNvGrpSpPr/>
+        <p:nvPr/>
+      </p:nvGrpSpPr>
+      <p:grpSpPr>
+        <a:xfrm>
+          <a:off x="0" y="0"/>
+          <a:ext cx="0" cy="0"/>
+          <a:chOff x="0" y="0"/>
+          <a:chExt cx="0" cy="0"/>
+        </a:xfrm>
+      </p:grpSpPr>
+      <p:grpSp>
+        <p:nvGrpSpPr>
+          <p:cNvPr id="10" name="Group 9">
+            <a:extLst>
+              <a:ext uri="{FF2B5EF4-FFF2-40B4-BE49-F238E27FC236}">
+                <a16:creationId xmlns:a16="http://schemas.microsoft.com/office/drawing/2014/main" id="{08F94D66-27EC-4CB8-8226-D7F41C161863}"/>
+              </a:ext>
+              <a:ext uri="{C183D7F6-B498-43B3-948B-1728B52AA6E4}">
+                <adec:decorative xmlns:adec="http://schemas.microsoft.com/office/drawing/2017/decorative" val="1"/>
+              </a:ext>
+            </a:extLst>
+          </p:cNvPr>
+          <p:cNvGrpSpPr>
+            <a:grpSpLocks noGrp="1" noUngrp="1" noRot="1" noChangeAspect="1" noMove="1" noResize="1"/>
+          </p:cNvGrpSpPr>
+          <p:nvPr>
+            <p:extLst>
+              <p:ext uri="{386F3935-93C4-4BCD-93E2-E3B085C9AB24}">
+                <p16:designElem xmlns:p16="http://schemas.microsoft.com/office/powerpoint/2015/main" val="1"/>
+              </p:ext>
+            </p:extLst>
+          </p:nvPr>
+        </p:nvGrpSpPr>
+        <p:grpSpPr>
+          <a:xfrm>
+            <a:off x="546100" y="-4763"/>
+            <a:ext cx="5014912" cy="6862763"/>
+            <a:chOff x="2928938" y="-4763"/>
+            <a:chExt cx="5014912" cy="6862763"/>
+          </a:xfrm>
+        </p:grpSpPr>
+        <p:sp>
+          <p:nvSpPr>
+            <p:cNvPr id="11" name="Freeform 6">
+              <a:extLst>
+                <a:ext uri="{FF2B5EF4-FFF2-40B4-BE49-F238E27FC236}">
+                  <a16:creationId xmlns:a16="http://schemas.microsoft.com/office/drawing/2014/main" id="{1A53964C-7D93-4C48-A4A6-C4C2C393C59D}"/>
+                </a:ext>
+                <a:ext uri="{C183D7F6-B498-43B3-948B-1728B52AA6E4}">
+                  <adec:decorative xmlns:adec="http://schemas.microsoft.com/office/drawing/2017/decorative" val="1"/>
+                </a:ext>
+              </a:extLst>
+            </p:cNvPr>
+            <p:cNvSpPr/>
+            <p:nvPr>
+              <p:extLst>
+                <p:ext uri="{386F3935-93C4-4BCD-93E2-E3B085C9AB24}">
+                  <p16:designElem xmlns:p16="http://schemas.microsoft.com/office/powerpoint/2015/main" val="1"/>
+                </p:ext>
+              </p:extLst>
+            </p:nvPr>
+          </p:nvSpPr>
+          <p:spPr bwMode="auto">
+            <a:xfrm>
+              <a:off x="3367088" y="-4763"/>
+              <a:ext cx="1063625" cy="2782888"/>
+            </a:xfrm>
+            <a:custGeom>
+              <a:avLst/>
+              <a:gdLst/>
+              <a:ahLst/>
+              <a:cxnLst/>
+              <a:rect l="0" t="0" r="r" b="b"/>
+              <a:pathLst>
+                <a:path w="670" h="1753">
+                  <a:moveTo>
+                    <a:pt x="0" y="1696"/>
+                  </a:moveTo>
+                  <a:lnTo>
+                    <a:pt x="225" y="1753"/>
+                  </a:lnTo>
+                  <a:lnTo>
+                    <a:pt x="670" y="0"/>
+                  </a:lnTo>
+                  <a:lnTo>
+                    <a:pt x="430" y="0"/>
+                  </a:lnTo>
+                  <a:lnTo>
+                    <a:pt x="0" y="1696"/>
+                  </a:lnTo>
+                  <a:close/>
+                </a:path>
+              </a:pathLst>
+            </a:custGeom>
+            <a:solidFill>
+              <a:schemeClr val="accent1"/>
+            </a:solidFill>
+            <a:ln>
+              <a:noFill/>
+            </a:ln>
+          </p:spPr>
+        </p:sp>
+        <p:sp>
+          <p:nvSpPr>
+            <p:cNvPr id="12" name="Freeform 7">
+              <a:extLst>
+                <a:ext uri="{FF2B5EF4-FFF2-40B4-BE49-F238E27FC236}">
+                  <a16:creationId xmlns:a16="http://schemas.microsoft.com/office/drawing/2014/main" id="{9C944EEC-539E-4389-8785-58E65D04E8DC}"/>
+                </a:ext>
+                <a:ext uri="{C183D7F6-B498-43B3-948B-1728B52AA6E4}">
+                  <adec:decorative xmlns:adec="http://schemas.microsoft.com/office/drawing/2017/decorative" val="1"/>
+                </a:ext>
+              </a:extLst>
+            </p:cNvPr>
+            <p:cNvSpPr/>
+            <p:nvPr>
+              <p:extLst>
+                <p:ext uri="{386F3935-93C4-4BCD-93E2-E3B085C9AB24}">
+                  <p16:designElem xmlns:p16="http://schemas.microsoft.com/office/powerpoint/2015/main" val="1"/>
+                </p:ext>
+              </p:extLst>
+            </p:nvPr>
+          </p:nvSpPr>
+          <p:spPr bwMode="auto">
+            <a:xfrm>
+              <a:off x="2928938" y="-4763"/>
+              <a:ext cx="1035050" cy="2673350"/>
+            </a:xfrm>
+            <a:custGeom>
+              <a:avLst/>
+              <a:gdLst/>
+              <a:ahLst/>
+              <a:cxnLst/>
+              <a:rect l="0" t="0" r="r" b="b"/>
+              <a:pathLst>
+                <a:path w="652" h="1684">
+                  <a:moveTo>
+                    <a:pt x="225" y="1684"/>
+                  </a:moveTo>
+                  <a:lnTo>
+                    <a:pt x="652" y="0"/>
+                  </a:lnTo>
+                  <a:lnTo>
+                    <a:pt x="411" y="0"/>
+                  </a:lnTo>
+                  <a:lnTo>
+                    <a:pt x="0" y="1627"/>
+                  </a:lnTo>
+                  <a:lnTo>
+                    <a:pt x="219" y="1681"/>
+                  </a:lnTo>
+                  <a:lnTo>
+                    <a:pt x="225" y="1684"/>
+                  </a:lnTo>
+                  <a:close/>
+                </a:path>
+              </a:pathLst>
+            </a:custGeom>
+            <a:solidFill>
+              <a:schemeClr val="tx1">
+                <a:lumMod val="65000"/>
+                <a:lumOff val="35000"/>
+              </a:schemeClr>
+            </a:solidFill>
+            <a:ln>
+              <a:noFill/>
+            </a:ln>
+          </p:spPr>
+        </p:sp>
+        <p:sp>
+          <p:nvSpPr>
+            <p:cNvPr id="13" name="Freeform 9">
+              <a:extLst>
+                <a:ext uri="{FF2B5EF4-FFF2-40B4-BE49-F238E27FC236}">
+                  <a16:creationId xmlns:a16="http://schemas.microsoft.com/office/drawing/2014/main" id="{7836EB7E-895C-4D68-B92E-312B371CBDBF}"/>
+                </a:ext>
+                <a:ext uri="{C183D7F6-B498-43B3-948B-1728B52AA6E4}">
+                  <adec:decorative xmlns:adec="http://schemas.microsoft.com/office/drawing/2017/decorative" val="1"/>
+                </a:ext>
+              </a:extLst>
+            </p:cNvPr>
+            <p:cNvSpPr/>
+            <p:nvPr>
+              <p:extLst>
+                <p:ext uri="{386F3935-93C4-4BCD-93E2-E3B085C9AB24}">
+                  <p16:designElem xmlns:p16="http://schemas.microsoft.com/office/powerpoint/2015/main" val="1"/>
+                </p:ext>
+              </p:extLst>
+            </p:nvPr>
+          </p:nvSpPr>
+          <p:spPr bwMode="auto">
+            <a:xfrm>
+              <a:off x="2928938" y="2582862"/>
+              <a:ext cx="2693987" cy="4275138"/>
+            </a:xfrm>
+            <a:custGeom>
+              <a:avLst/>
+              <a:gdLst/>
+              <a:ahLst/>
+              <a:cxnLst/>
+              <a:rect l="0" t="0" r="r" b="b"/>
+              <a:pathLst>
+                <a:path w="1697" h="2693">
+                  <a:moveTo>
+                    <a:pt x="0" y="0"/>
+                  </a:moveTo>
+                  <a:lnTo>
+                    <a:pt x="1622" y="2693"/>
+                  </a:lnTo>
+                  <a:lnTo>
+                    <a:pt x="1697" y="2693"/>
+                  </a:lnTo>
+                  <a:lnTo>
+                    <a:pt x="0" y="0"/>
+                  </a:lnTo>
+                  <a:close/>
+                </a:path>
+              </a:pathLst>
+            </a:custGeom>
+            <a:solidFill>
+              <a:schemeClr val="tx1">
+                <a:lumMod val="85000"/>
+                <a:lumOff val="15000"/>
+              </a:schemeClr>
+            </a:solidFill>
+            <a:ln>
+              <a:noFill/>
+            </a:ln>
+          </p:spPr>
+        </p:sp>
+        <p:sp>
+          <p:nvSpPr>
+            <p:cNvPr id="14" name="Freeform 10">
+              <a:extLst>
+                <a:ext uri="{FF2B5EF4-FFF2-40B4-BE49-F238E27FC236}">
+                  <a16:creationId xmlns:a16="http://schemas.microsoft.com/office/drawing/2014/main" id="{0F29242B-8CE7-4636-B326-4BEE42EB6D6F}"/>
+                </a:ext>
+                <a:ext uri="{C183D7F6-B498-43B3-948B-1728B52AA6E4}">
+                  <adec:decorative xmlns:adec="http://schemas.microsoft.com/office/drawing/2017/decorative" val="1"/>
+                </a:ext>
+              </a:extLst>
+            </p:cNvPr>
+            <p:cNvSpPr/>
+            <p:nvPr>
+              <p:extLst>
+                <p:ext uri="{386F3935-93C4-4BCD-93E2-E3B085C9AB24}">
+                  <p16:designElem xmlns:p16="http://schemas.microsoft.com/office/powerpoint/2015/main" val="1"/>
+                </p:ext>
+              </p:extLst>
+            </p:nvPr>
+          </p:nvSpPr>
+          <p:spPr bwMode="auto">
+            <a:xfrm>
+              <a:off x="3371850" y="2692400"/>
+              <a:ext cx="3332162" cy="4165600"/>
+            </a:xfrm>
+            <a:custGeom>
+              <a:avLst/>
+              <a:gdLst/>
+              <a:ahLst/>
+              <a:cxnLst/>
+              <a:rect l="0" t="0" r="r" b="b"/>
+              <a:pathLst>
+                <a:path w="2099" h="2624">
+                  <a:moveTo>
+                    <a:pt x="2099" y="2624"/>
+                  </a:moveTo>
+                  <a:lnTo>
+                    <a:pt x="0" y="0"/>
+                  </a:lnTo>
+                  <a:lnTo>
+                    <a:pt x="2021" y="2624"/>
+                  </a:lnTo>
+                  <a:lnTo>
+                    <a:pt x="2099" y="2624"/>
+                  </a:lnTo>
+                  <a:close/>
+                </a:path>
+              </a:pathLst>
+            </a:custGeom>
+            <a:solidFill>
+              <a:schemeClr val="accent1">
+                <a:lumMod val="50000"/>
+              </a:schemeClr>
+            </a:solidFill>
+            <a:ln>
+              <a:noFill/>
+            </a:ln>
+          </p:spPr>
+        </p:sp>
+        <p:sp>
+          <p:nvSpPr>
+            <p:cNvPr id="15" name="Freeform 11">
+              <a:extLst>
+                <a:ext uri="{FF2B5EF4-FFF2-40B4-BE49-F238E27FC236}">
+                  <a16:creationId xmlns:a16="http://schemas.microsoft.com/office/drawing/2014/main" id="{4D0B8E9A-7727-4AD9-974E-8815F0B20EB4}"/>
+                </a:ext>
+                <a:ext uri="{C183D7F6-B498-43B3-948B-1728B52AA6E4}">
+                  <adec:decorative xmlns:adec="http://schemas.microsoft.com/office/drawing/2017/decorative" val="1"/>
+                </a:ext>
+              </a:extLst>
+            </p:cNvPr>
+            <p:cNvSpPr/>
+            <p:nvPr>
+              <p:extLst>
+                <p:ext uri="{386F3935-93C4-4BCD-93E2-E3B085C9AB24}">
+                  <p16:designElem xmlns:p16="http://schemas.microsoft.com/office/powerpoint/2015/main" val="1"/>
+                </p:ext>
+              </p:extLst>
+            </p:nvPr>
+          </p:nvSpPr>
+          <p:spPr bwMode="auto">
+            <a:xfrm>
+              <a:off x="3367088" y="2687637"/>
+              <a:ext cx="4576762" cy="4170363"/>
+            </a:xfrm>
+            <a:custGeom>
+              <a:avLst/>
+              <a:gdLst/>
+              <a:ahLst/>
+              <a:cxnLst/>
+              <a:rect l="0" t="0" r="r" b="b"/>
+              <a:pathLst>
+                <a:path w="2883" h="2627">
+                  <a:moveTo>
+                    <a:pt x="0" y="0"/>
+                  </a:moveTo>
+                  <a:lnTo>
+                    <a:pt x="3" y="3"/>
+                  </a:lnTo>
+                  <a:lnTo>
+                    <a:pt x="2102" y="2627"/>
+                  </a:lnTo>
+                  <a:lnTo>
+                    <a:pt x="2883" y="2627"/>
+                  </a:lnTo>
+                  <a:lnTo>
+                    <a:pt x="225" y="57"/>
+                  </a:lnTo>
+                  <a:lnTo>
+                    <a:pt x="0" y="0"/>
+                  </a:lnTo>
+                  <a:close/>
+                </a:path>
+              </a:pathLst>
+            </a:custGeom>
+            <a:solidFill>
+              <a:schemeClr val="accent1">
+                <a:lumMod val="75000"/>
+              </a:schemeClr>
+            </a:solidFill>
+            <a:ln>
+              <a:noFill/>
+            </a:ln>
+          </p:spPr>
+        </p:sp>
+        <p:sp>
+          <p:nvSpPr>
+            <p:cNvPr id="16" name="Freeform 12">
+              <a:extLst>
+                <a:ext uri="{FF2B5EF4-FFF2-40B4-BE49-F238E27FC236}">
+                  <a16:creationId xmlns:a16="http://schemas.microsoft.com/office/drawing/2014/main" id="{1CD6C65C-71BE-4549-926A-1C1135FD06DF}"/>
+                </a:ext>
+                <a:ext uri="{C183D7F6-B498-43B3-948B-1728B52AA6E4}">
+                  <adec:decorative xmlns:adec="http://schemas.microsoft.com/office/drawing/2017/decorative" val="1"/>
+                </a:ext>
+              </a:extLst>
+            </p:cNvPr>
+            <p:cNvSpPr/>
+            <p:nvPr>
+              <p:extLst>
+                <p:ext uri="{386F3935-93C4-4BCD-93E2-E3B085C9AB24}">
+                  <p16:designElem xmlns:p16="http://schemas.microsoft.com/office/powerpoint/2015/main" val="1"/>
+                </p:ext>
+              </p:extLst>
+            </p:nvPr>
+          </p:nvSpPr>
+          <p:spPr bwMode="auto">
+            <a:xfrm>
+              <a:off x="2928938" y="2578100"/>
+              <a:ext cx="3584575" cy="4279900"/>
+            </a:xfrm>
+            <a:custGeom>
+              <a:avLst/>
+              <a:gdLst/>
+              <a:ahLst/>
+              <a:cxnLst/>
+              <a:rect l="0" t="0" r="r" b="b"/>
+              <a:pathLst>
+                <a:path w="2258" h="2696">
+                  <a:moveTo>
+                    <a:pt x="2258" y="2696"/>
+                  </a:moveTo>
+                  <a:lnTo>
+                    <a:pt x="264" y="111"/>
+                  </a:lnTo>
+                  <a:lnTo>
+                    <a:pt x="228" y="60"/>
+                  </a:lnTo>
+                  <a:lnTo>
+                    <a:pt x="225" y="57"/>
+                  </a:lnTo>
+                  <a:lnTo>
+                    <a:pt x="0" y="0"/>
+                  </a:lnTo>
+                  <a:lnTo>
+                    <a:pt x="0" y="3"/>
+                  </a:lnTo>
+                  <a:lnTo>
+                    <a:pt x="1697" y="2696"/>
+                  </a:lnTo>
+                  <a:lnTo>
+                    <a:pt x="2258" y="2696"/>
+                  </a:lnTo>
+                  <a:close/>
+                </a:path>
+              </a:pathLst>
+            </a:custGeom>
+            <a:solidFill>
+              <a:schemeClr val="tx1">
+                <a:lumMod val="75000"/>
+                <a:lumOff val="25000"/>
+              </a:schemeClr>
+            </a:solidFill>
+            <a:ln>
+              <a:noFill/>
+            </a:ln>
+          </p:spPr>
+        </p:sp>
+      </p:grpSp>
+      <p:sp>
+        <p:nvSpPr>
+          <p:cNvPr id="2" name="Title 1">
+            <a:extLst>
+              <a:ext uri="{FF2B5EF4-FFF2-40B4-BE49-F238E27FC236}">
+                <a16:creationId xmlns:a16="http://schemas.microsoft.com/office/drawing/2014/main" id="{4316ECA8-CFCD-4398-8370-211FD988D9FA}"/>
+              </a:ext>
+            </a:extLst>
+          </p:cNvPr>
+          <p:cNvSpPr>
+            <a:spLocks noGrp="1"/>
+          </p:cNvSpPr>
+          <p:nvPr>
+            <p:ph type="title"/>
+          </p:nvPr>
+        </p:nvSpPr>
+        <p:spPr>
+          <a:xfrm>
+            <a:off x="546100" y="2078120"/>
+            <a:ext cx="4429387" cy="1898581"/>
+          </a:xfrm>
+        </p:spPr>
+        <p:txBody>
+          <a:bodyPr vert="horz" lIns="91440" tIns="45720" rIns="91440" bIns="45720" rtlCol="0" anchor="b">
+            <a:normAutofit fontScale="90000"/>
+          </a:bodyPr>
+          <a:lstStyle/>
+          <a:p>
+            <a:pPr algn="r">
+              <a:lnSpc>
+                <a:spcPct val="90000"/>
+              </a:lnSpc>
+            </a:pPr>
+            <a:r>
+              <a:rPr lang="en-US" sz="4800" dirty="0"/>
+              <a:t>Ability to View Business Cards</a:t>
+            </a:r>
+            <a:br>
+              <a:rPr lang="en-US" sz="4800" dirty="0"/>
+            </a:br>
+            <a:br>
+              <a:rPr lang="en-US" sz="4800" dirty="0"/>
+            </a:br>
+            <a:endParaRPr lang="en-US" sz="4800" dirty="0"/>
+          </a:p>
+        </p:txBody>
+      </p:sp>
+      <p:pic>
+        <p:nvPicPr>
+          <p:cNvPr id="6" name="Content Placeholder 5" descr="A screenshot of a cell phone&#10;&#10;Description automatically generated">
+            <a:extLst>
+              <a:ext uri="{FF2B5EF4-FFF2-40B4-BE49-F238E27FC236}">
+                <a16:creationId xmlns:a16="http://schemas.microsoft.com/office/drawing/2014/main" id="{663F450B-A087-4E34-88E2-3AEC3845F57C}"/>
+              </a:ext>
+            </a:extLst>
+          </p:cNvPr>
+          <p:cNvPicPr>
+            <a:picLocks noGrp="1" noChangeAspect="1"/>
+          </p:cNvPicPr>
+          <p:nvPr>
+            <p:ph idx="1"/>
+          </p:nvPr>
+        </p:nvPicPr>
+        <p:blipFill>
+          <a:blip r:embed="rId3">
+            <a:extLst>
+              <a:ext uri="{28A0092B-C50C-407E-A947-70E740481C1C}">
+                <a14:useLocalDpi xmlns:a14="http://schemas.microsoft.com/office/drawing/2010/main" val="0"/>
+              </a:ext>
+            </a:extLst>
+          </a:blip>
+          <a:stretch>
+            <a:fillRect/>
+          </a:stretch>
+        </p:blipFill>
+        <p:spPr>
+          <a:xfrm>
+            <a:off x="8831264" y="575902"/>
+            <a:ext cx="3209735" cy="5706198"/>
+          </a:xfrm>
+        </p:spPr>
+      </p:pic>
+      <p:pic>
+        <p:nvPicPr>
+          <p:cNvPr id="8" name="Picture 7">
+            <a:extLst>
+              <a:ext uri="{FF2B5EF4-FFF2-40B4-BE49-F238E27FC236}">
+                <a16:creationId xmlns:a16="http://schemas.microsoft.com/office/drawing/2014/main" id="{65AD720C-4456-4C33-9078-4CCF58744167}"/>
+              </a:ext>
+            </a:extLst>
+          </p:cNvPr>
+          <p:cNvPicPr>
+            <a:picLocks noChangeAspect="1"/>
+          </p:cNvPicPr>
+          <p:nvPr/>
+        </p:nvPicPr>
+        <p:blipFill>
+          <a:blip r:embed="rId4">
+            <a:extLst>
+              <a:ext uri="{28A0092B-C50C-407E-A947-70E740481C1C}">
+                <a14:useLocalDpi xmlns:a14="http://schemas.microsoft.com/office/drawing/2010/main" val="0"/>
+              </a:ext>
+            </a:extLst>
+          </a:blip>
+          <a:stretch>
+            <a:fillRect/>
+          </a:stretch>
+        </p:blipFill>
+        <p:spPr>
+          <a:xfrm>
+            <a:off x="5088376" y="575902"/>
+            <a:ext cx="3209735" cy="5706195"/>
+          </a:xfrm>
+          <a:prstGeom prst="rect">
+            <a:avLst/>
+          </a:prstGeom>
+        </p:spPr>
+      </p:pic>
+    </p:spTree>
+    <p:extLst>
+      <p:ext uri="{BB962C8B-B14F-4D97-AF65-F5344CB8AC3E}">
+        <p14:creationId xmlns:p14="http://schemas.microsoft.com/office/powerpoint/2010/main" val="1775472988"/>
+      </p:ext>
+    </p:extLst>
+  </p:cSld>
+  <p:clrMapOvr>
+    <a:masterClrMapping/>
+  </p:clrMapOvr>
+</p:sld>
+</file>
+
+<file path=ppt/slides/slide9.xml><?xml version="1.0" encoding="utf-8"?>
+<p:sld xmlns:a="http://schemas.openxmlformats.org/drawingml/2006/main" xmlns:r="http://schemas.openxmlformats.org/officeDocument/2006/relationships" xmlns:p="http://schemas.openxmlformats.org/presentationml/2006/main">
+  <p:cSld>
+    <p:spTree>
+      <p:nvGrpSpPr>
+        <p:cNvPr id="1" name=""/>
+        <p:cNvGrpSpPr/>
+        <p:nvPr/>
+      </p:nvGrpSpPr>
+      <p:grpSpPr>
+        <a:xfrm>
+          <a:off x="0" y="0"/>
+          <a:ext cx="0" cy="0"/>
+          <a:chOff x="0" y="0"/>
+          <a:chExt cx="0" cy="0"/>
+        </a:xfrm>
+      </p:grpSpPr>
+      <p:sp>
+        <p:nvSpPr>
+          <p:cNvPr id="2" name="Title 1">
+            <a:extLst>
+              <a:ext uri="{FF2B5EF4-FFF2-40B4-BE49-F238E27FC236}">
+                <a16:creationId xmlns:a16="http://schemas.microsoft.com/office/drawing/2014/main" id="{764FBD5F-5827-413D-8CD3-1ACE5E844A83}"/>
+              </a:ext>
+            </a:extLst>
+          </p:cNvPr>
+          <p:cNvSpPr>
+            <a:spLocks noGrp="1"/>
+          </p:cNvSpPr>
+          <p:nvPr>
+            <p:ph type="title"/>
+          </p:nvPr>
+        </p:nvSpPr>
+        <p:spPr>
+          <a:xfrm>
+            <a:off x="1484311" y="685800"/>
+            <a:ext cx="10018713" cy="1071979"/>
+          </a:xfrm>
+        </p:spPr>
+        <p:txBody>
+          <a:bodyPr/>
+          <a:lstStyle/>
+          <a:p>
+            <a:r>
+              <a:rPr lang="en-ZA" dirty="0"/>
+              <a:t>Automated Testing</a:t>
+            </a:r>
+          </a:p>
+        </p:txBody>
+      </p:sp>
+      <p:sp>
+        <p:nvSpPr>
+          <p:cNvPr id="3" name="Content Placeholder 2">
+            <a:extLst>
+              <a:ext uri="{FF2B5EF4-FFF2-40B4-BE49-F238E27FC236}">
+                <a16:creationId xmlns:a16="http://schemas.microsoft.com/office/drawing/2014/main" id="{61447AF0-20CC-45F5-BFE0-4952801F3657}"/>
+              </a:ext>
+            </a:extLst>
+          </p:cNvPr>
+          <p:cNvSpPr>
+            <a:spLocks noGrp="1"/>
+          </p:cNvSpPr>
+          <p:nvPr>
+            <p:ph sz="half" idx="1"/>
+          </p:nvPr>
+        </p:nvSpPr>
+        <p:spPr>
+          <a:xfrm>
+            <a:off x="1058183" y="2294138"/>
+            <a:ext cx="4895055" cy="713173"/>
+          </a:xfrm>
+        </p:spPr>
+        <p:txBody>
+          <a:bodyPr>
+            <a:normAutofit/>
+          </a:bodyPr>
+          <a:lstStyle/>
+          <a:p>
+            <a:pPr marL="0" indent="0" algn="ctr">
+              <a:buNone/>
+            </a:pPr>
+            <a:r>
+              <a:rPr lang="en-ZA" sz="3200" dirty="0"/>
+              <a:t>Unit Testing</a:t>
+            </a:r>
+          </a:p>
+        </p:txBody>
+      </p:sp>
+      <p:sp>
+        <p:nvSpPr>
+          <p:cNvPr id="4" name="Content Placeholder 3">
+            <a:extLst>
+              <a:ext uri="{FF2B5EF4-FFF2-40B4-BE49-F238E27FC236}">
+                <a16:creationId xmlns:a16="http://schemas.microsoft.com/office/drawing/2014/main" id="{35FC1687-A9AF-4392-B17C-9A2FAC0F89C0}"/>
+              </a:ext>
+            </a:extLst>
+          </p:cNvPr>
+          <p:cNvSpPr>
+            <a:spLocks noGrp="1"/>
+          </p:cNvSpPr>
+          <p:nvPr>
+            <p:ph sz="half" idx="2"/>
+          </p:nvPr>
+        </p:nvSpPr>
+        <p:spPr>
+          <a:xfrm>
+            <a:off x="6493667" y="2351842"/>
+            <a:ext cx="4895056" cy="597763"/>
+          </a:xfrm>
+        </p:spPr>
+        <p:txBody>
+          <a:bodyPr>
+            <a:normAutofit/>
+          </a:bodyPr>
+          <a:lstStyle/>
+          <a:p>
+            <a:pPr marL="0" indent="0" algn="ctr">
+              <a:buNone/>
+            </a:pPr>
+            <a:r>
+              <a:rPr lang="en-ZA" sz="3200" dirty="0"/>
+              <a:t>Integration Testing</a:t>
+            </a:r>
+          </a:p>
+        </p:txBody>
+      </p:sp>
+      <p:pic>
+        <p:nvPicPr>
+          <p:cNvPr id="6" name="Graphic 5">
+            <a:extLst>
+              <a:ext uri="{FF2B5EF4-FFF2-40B4-BE49-F238E27FC236}">
+                <a16:creationId xmlns:a16="http://schemas.microsoft.com/office/drawing/2014/main" id="{5D336900-A004-4671-B471-CA55CB602B27}"/>
+              </a:ext>
+            </a:extLst>
+          </p:cNvPr>
+          <p:cNvPicPr>
+            <a:picLocks noChangeAspect="1"/>
+          </p:cNvPicPr>
+          <p:nvPr/>
+        </p:nvPicPr>
+        <p:blipFill>
+          <a:blip r:embed="rId2">
+            <a:extLst>
+              <a:ext uri="{28A0092B-C50C-407E-A947-70E740481C1C}">
+                <a14:useLocalDpi xmlns:a14="http://schemas.microsoft.com/office/drawing/2010/main" val="0"/>
+              </a:ext>
+              <a:ext uri="{96DAC541-7B7A-43D3-8B79-37D633B846F1}">
+                <asvg:svgBlip xmlns:asvg="http://schemas.microsoft.com/office/drawing/2016/SVG/main" r:embed="rId3"/>
+              </a:ext>
+            </a:extLst>
+          </a:blip>
+          <a:stretch>
+            <a:fillRect/>
+          </a:stretch>
+        </p:blipFill>
+        <p:spPr>
+          <a:xfrm>
+            <a:off x="1484311" y="3056138"/>
+            <a:ext cx="3753998" cy="1034826"/>
+          </a:xfrm>
+          <a:prstGeom prst="rect">
+            <a:avLst/>
+          </a:prstGeom>
+        </p:spPr>
+      </p:pic>
+      <p:pic>
+        <p:nvPicPr>
+          <p:cNvPr id="8" name="Picture 7">
+            <a:extLst>
+              <a:ext uri="{FF2B5EF4-FFF2-40B4-BE49-F238E27FC236}">
+                <a16:creationId xmlns:a16="http://schemas.microsoft.com/office/drawing/2014/main" id="{2706660E-412B-4775-9B04-048292791C28}"/>
+              </a:ext>
+            </a:extLst>
+          </p:cNvPr>
+          <p:cNvPicPr>
+            <a:picLocks noChangeAspect="1"/>
+          </p:cNvPicPr>
+          <p:nvPr/>
+        </p:nvPicPr>
+        <p:blipFill>
+          <a:blip r:embed="rId4">
+            <a:extLst>
+              <a:ext uri="{28A0092B-C50C-407E-A947-70E740481C1C}">
+                <a14:useLocalDpi xmlns:a14="http://schemas.microsoft.com/office/drawing/2010/main" val="0"/>
+              </a:ext>
+            </a:extLst>
+          </a:blip>
+          <a:stretch>
+            <a:fillRect/>
+          </a:stretch>
+        </p:blipFill>
+        <p:spPr>
+          <a:xfrm>
+            <a:off x="6953693" y="2949605"/>
+            <a:ext cx="3614664" cy="1131694"/>
+          </a:xfrm>
+          <a:prstGeom prst="rect">
+            <a:avLst/>
+          </a:prstGeom>
+        </p:spPr>
+      </p:pic>
+      <p:sp>
+        <p:nvSpPr>
+          <p:cNvPr id="9" name="TextBox 8">
+            <a:extLst>
+              <a:ext uri="{FF2B5EF4-FFF2-40B4-BE49-F238E27FC236}">
+                <a16:creationId xmlns:a16="http://schemas.microsoft.com/office/drawing/2014/main" id="{388490BE-7AE6-42A5-9B73-EB8066F6390D}"/>
+              </a:ext>
+            </a:extLst>
+          </p:cNvPr>
+          <p:cNvSpPr txBox="1"/>
+          <p:nvPr/>
+        </p:nvSpPr>
+        <p:spPr>
+          <a:xfrm>
+            <a:off x="1660124" y="4341180"/>
+            <a:ext cx="3871148" cy="646331"/>
+          </a:xfrm>
+          <a:prstGeom prst="rect">
+            <a:avLst/>
+          </a:prstGeom>
+          <a:noFill/>
+        </p:spPr>
+        <p:txBody>
+          <a:bodyPr wrap="square" rtlCol="0">
+            <a:spAutoFit/>
+          </a:bodyPr>
+          <a:lstStyle/>
+          <a:p>
+            <a:pPr marL="285750" indent="-285750">
+              <a:buFont typeface="Arial" panose="020B0604020202020204" pitchFamily="34" charset="0"/>
+              <a:buChar char="•"/>
+            </a:pPr>
+            <a:r>
+              <a:rPr lang="en-ZA" dirty="0"/>
+              <a:t>Open Source Testing framework for JavaScript</a:t>
+            </a:r>
+          </a:p>
+        </p:txBody>
+      </p:sp>
+      <p:sp>
+        <p:nvSpPr>
+          <p:cNvPr id="10" name="TextBox 9">
+            <a:extLst>
+              <a:ext uri="{FF2B5EF4-FFF2-40B4-BE49-F238E27FC236}">
+                <a16:creationId xmlns:a16="http://schemas.microsoft.com/office/drawing/2014/main" id="{01400452-30FC-4CCE-ADB3-EE741E39A9F0}"/>
+              </a:ext>
+            </a:extLst>
+          </p:cNvPr>
+          <p:cNvSpPr txBox="1"/>
+          <p:nvPr/>
+        </p:nvSpPr>
+        <p:spPr>
+          <a:xfrm>
+            <a:off x="6953693" y="4267757"/>
+            <a:ext cx="4660777" cy="1200329"/>
+          </a:xfrm>
+          <a:prstGeom prst="rect">
+            <a:avLst/>
+          </a:prstGeom>
+          <a:noFill/>
+        </p:spPr>
+        <p:txBody>
+          <a:bodyPr wrap="square" rtlCol="0">
+            <a:spAutoFit/>
+          </a:bodyPr>
+          <a:lstStyle/>
+          <a:p>
+            <a:pPr marL="285750" indent="-285750">
+              <a:buFont typeface="Arial" panose="020B0604020202020204" pitchFamily="34" charset="0"/>
+              <a:buChar char="•"/>
+            </a:pPr>
+            <a:r>
+              <a:rPr lang="en-ZA" dirty="0"/>
+              <a:t>A hosted, distributed continuous integration service</a:t>
+            </a:r>
+          </a:p>
+          <a:p>
+            <a:pPr marL="285750" indent="-285750">
+              <a:buFont typeface="Arial" panose="020B0604020202020204" pitchFamily="34" charset="0"/>
+              <a:buChar char="•"/>
+            </a:pPr>
+            <a:r>
+              <a:rPr lang="en-ZA" dirty="0"/>
+              <a:t>Used to build and test software projects hosted on GitHub</a:t>
+            </a:r>
+          </a:p>
+        </p:txBody>
+      </p:sp>
+    </p:spTree>
+    <p:extLst>
+      <p:ext uri="{BB962C8B-B14F-4D97-AF65-F5344CB8AC3E}">
+        <p14:creationId xmlns:p14="http://schemas.microsoft.com/office/powerpoint/2010/main" val="2463672719"/>
       </p:ext>
     </p:extLst>
   </p:cSld>

</xml_diff>